<commit_message>
Capitulo 3 - Ajustes Organização de material auxiliar na pasta de documentos.
</commit_message>
<xml_diff>
--- a/2-Java-Programmer-Modulo-II/09.Capitulo03.pptx
+++ b/2-Java-Programmer-Modulo-II/09.Capitulo03.pptx
@@ -273,7 +273,7 @@
               <a:pPr>
                 <a:defRPr/>
               </a:pPr>
-              <a:t>19/05/2012</a:t>
+              <a:t>21/05/2012</a:t>
             </a:fld>
             <a:endParaRPr lang="pt-BR"/>
           </a:p>
@@ -3411,7 +3411,7 @@
               <a:pPr>
                 <a:defRPr/>
               </a:pPr>
-              <a:t>19/05/2012</a:t>
+              <a:t>21/05/2012</a:t>
             </a:fld>
             <a:endParaRPr lang="pt-BR"/>
           </a:p>
@@ -3603,7 +3603,7 @@
               <a:pPr>
                 <a:defRPr/>
               </a:pPr>
-              <a:t>19/05/2012</a:t>
+              <a:t>21/05/2012</a:t>
             </a:fld>
             <a:endParaRPr lang="pt-BR"/>
           </a:p>
@@ -3805,7 +3805,7 @@
               <a:pPr>
                 <a:defRPr/>
               </a:pPr>
-              <a:t>19/05/2012</a:t>
+              <a:t>21/05/2012</a:t>
             </a:fld>
             <a:endParaRPr lang="pt-BR"/>
           </a:p>
@@ -4001,7 +4001,7 @@
               <a:pPr>
                 <a:defRPr/>
               </a:pPr>
-              <a:t>19/05/2012</a:t>
+              <a:t>21/05/2012</a:t>
             </a:fld>
             <a:endParaRPr lang="pt-BR"/>
           </a:p>
@@ -4507,7 +4507,7 @@
               <a:pPr>
                 <a:defRPr/>
               </a:pPr>
-              <a:t>19/05/2012</a:t>
+              <a:t>21/05/2012</a:t>
             </a:fld>
             <a:endParaRPr lang="pt-BR"/>
           </a:p>
@@ -4798,7 +4798,7 @@
               <a:pPr>
                 <a:defRPr/>
               </a:pPr>
-              <a:t>19/05/2012</a:t>
+              <a:t>21/05/2012</a:t>
             </a:fld>
             <a:endParaRPr lang="pt-BR"/>
           </a:p>
@@ -5199,7 +5199,7 @@
               <a:pPr>
                 <a:defRPr/>
               </a:pPr>
-              <a:t>19/05/2012</a:t>
+              <a:t>21/05/2012</a:t>
             </a:fld>
             <a:endParaRPr lang="pt-BR"/>
           </a:p>
@@ -5348,7 +5348,7 @@
               <a:pPr>
                 <a:defRPr/>
               </a:pPr>
-              <a:t>19/05/2012</a:t>
+              <a:t>21/05/2012</a:t>
             </a:fld>
             <a:endParaRPr lang="pt-BR"/>
           </a:p>
@@ -5465,7 +5465,7 @@
               <a:pPr>
                 <a:defRPr/>
               </a:pPr>
-              <a:t>19/05/2012</a:t>
+              <a:t>21/05/2012</a:t>
             </a:fld>
             <a:endParaRPr lang="pt-BR"/>
           </a:p>
@@ -5741,7 +5741,7 @@
               <a:pPr>
                 <a:defRPr/>
               </a:pPr>
-              <a:t>19/05/2012</a:t>
+              <a:t>21/05/2012</a:t>
             </a:fld>
             <a:endParaRPr lang="pt-BR"/>
           </a:p>
@@ -6025,7 +6025,7 @@
               <a:pPr>
                 <a:defRPr/>
               </a:pPr>
-              <a:t>19/05/2012</a:t>
+              <a:t>21/05/2012</a:t>
             </a:fld>
             <a:endParaRPr lang="pt-BR"/>
           </a:p>
@@ -6503,7 +6503,7 @@
               <a:pPr>
                 <a:defRPr/>
               </a:pPr>
-              <a:t>19/05/2012</a:t>
+              <a:t>21/05/2012</a:t>
             </a:fld>
             <a:endParaRPr lang="pt-BR"/>
           </a:p>
@@ -11069,7 +11069,23 @@
                   <a:srgbClr val="FFC000"/>
                 </a:solidFill>
               </a:rPr>
-              <a:t>x == y</a:t>
+              <a:t>x </a:t>
+            </a:r>
+            <a:r>
+              <a:rPr lang="pt-BR" sz="2200" dirty="0" smtClean="0">
+                <a:solidFill>
+                  <a:srgbClr val="FFC000"/>
+                </a:solidFill>
+              </a:rPr>
+              <a:t>&gt; </a:t>
+            </a:r>
+            <a:r>
+              <a:rPr lang="pt-BR" sz="2200" dirty="0" smtClean="0">
+                <a:solidFill>
+                  <a:srgbClr val="FFC000"/>
+                </a:solidFill>
+              </a:rPr>
+              <a:t>y</a:t>
             </a:r>
             <a:r>
               <a:rPr lang="pt-BR" sz="2200" dirty="0" smtClean="0"/>
@@ -11099,7 +11115,7 @@
             </a:r>
             <a:r>
               <a:rPr lang="pt-BR" sz="2200" dirty="0" smtClean="0"/>
-              <a:t>("Valores iguais.");</a:t>
+              <a:t>(“O primeiro valor é maior.");</a:t>
             </a:r>
           </a:p>
           <a:p>
@@ -11141,7 +11157,23 @@
                   <a:srgbClr val="FFC000"/>
                 </a:solidFill>
               </a:rPr>
-              <a:t>x &gt; y</a:t>
+              <a:t>x </a:t>
+            </a:r>
+            <a:r>
+              <a:rPr lang="pt-BR" sz="2200" dirty="0" smtClean="0">
+                <a:solidFill>
+                  <a:srgbClr val="FFC000"/>
+                </a:solidFill>
+              </a:rPr>
+              <a:t>&lt; </a:t>
+            </a:r>
+            <a:r>
+              <a:rPr lang="pt-BR" sz="2200" dirty="0" smtClean="0">
+                <a:solidFill>
+                  <a:srgbClr val="FFC000"/>
+                </a:solidFill>
+              </a:rPr>
+              <a:t>y</a:t>
             </a:r>
             <a:r>
               <a:rPr lang="pt-BR" sz="2200" dirty="0" smtClean="0"/>
@@ -11171,7 +11203,7 @@
             </a:r>
             <a:r>
               <a:rPr lang="pt-BR" sz="2200" dirty="0" smtClean="0"/>
-              <a:t>(“O primeiro valor é maior.");</a:t>
+              <a:t>(“O segundo valor é maior.");</a:t>
             </a:r>
           </a:p>
           <a:p>
@@ -11223,7 +11255,7 @@
             </a:r>
             <a:r>
               <a:rPr lang="pt-BR" sz="2200" dirty="0" smtClean="0"/>
-              <a:t>(“O segundo valor é maior.");</a:t>
+              <a:t>("Valores iguais.");</a:t>
             </a:r>
           </a:p>
           <a:p>
@@ -11243,6 +11275,7 @@
               <a:rPr lang="pt-BR" sz="2200" dirty="0" smtClean="0"/>
               <a:t>}</a:t>
             </a:r>
+            <a:endParaRPr lang="pt-BR" sz="2200" dirty="0" smtClean="0"/>
           </a:p>
         </p:txBody>
       </p:sp>
@@ -11473,15 +11506,27 @@
                   <a:srgbClr val="FFC000"/>
                 </a:solidFill>
               </a:rPr>
-              <a:t>(valor2) == 0</a:t>
+              <a:t>(valor2) </a:t>
+            </a:r>
+            <a:r>
+              <a:rPr lang="pt-BR" sz="2200" dirty="0" smtClean="0">
+                <a:solidFill>
+                  <a:srgbClr val="FFC000"/>
+                </a:solidFill>
+              </a:rPr>
+              <a:t>&gt; </a:t>
+            </a:r>
+            <a:r>
+              <a:rPr lang="pt-BR" sz="2200" dirty="0" smtClean="0">
+                <a:solidFill>
+                  <a:srgbClr val="FFC000"/>
+                </a:solidFill>
+              </a:rPr>
+              <a:t>0</a:t>
             </a:r>
             <a:r>
               <a:rPr lang="pt-BR" sz="2200" dirty="0" smtClean="0"/>
-              <a:t>) </a:t>
-            </a:r>
-            <a:r>
-              <a:rPr lang="pt-BR" sz="2200" dirty="0" smtClean="0"/>
-              <a:t>{</a:t>
+              <a:t>) {</a:t>
             </a:r>
           </a:p>
           <a:p>
@@ -11504,7 +11549,7 @@
             </a:r>
             <a:r>
               <a:rPr lang="pt-BR" sz="2200" dirty="0" smtClean="0"/>
-              <a:t>("Strings iguais");</a:t>
+              <a:t>(“O primeiro String é maior");</a:t>
             </a:r>
           </a:p>
           <a:p>
@@ -11559,7 +11604,23 @@
                   <a:srgbClr val="FFC000"/>
                 </a:solidFill>
               </a:rPr>
-              <a:t>(valor2) &gt; 0</a:t>
+              <a:t>(valor2) </a:t>
+            </a:r>
+            <a:r>
+              <a:rPr lang="pt-BR" sz="2200" dirty="0" smtClean="0">
+                <a:solidFill>
+                  <a:srgbClr val="FFC000"/>
+                </a:solidFill>
+              </a:rPr>
+              <a:t>&lt; </a:t>
+            </a:r>
+            <a:r>
+              <a:rPr lang="pt-BR" sz="2200" dirty="0" smtClean="0">
+                <a:solidFill>
+                  <a:srgbClr val="FFC000"/>
+                </a:solidFill>
+              </a:rPr>
+              <a:t>0</a:t>
             </a:r>
             <a:r>
               <a:rPr lang="pt-BR" sz="2200" dirty="0" smtClean="0"/>
@@ -11586,7 +11647,7 @@
             </a:r>
             <a:r>
               <a:rPr lang="pt-BR" sz="2200" dirty="0" smtClean="0"/>
-              <a:t>(“O primeiro String é maior");</a:t>
+              <a:t>(“O segundo String é maior");</a:t>
             </a:r>
           </a:p>
           <a:p>
@@ -11632,7 +11693,7 @@
             </a:r>
             <a:r>
               <a:rPr lang="pt-BR" sz="2200" dirty="0" smtClean="0"/>
-              <a:t>(“O segundo String é maior");</a:t>
+              <a:t>("Strings iguais");</a:t>
             </a:r>
           </a:p>
           <a:p>
@@ -11649,6 +11710,7 @@
               <a:rPr lang="pt-BR" sz="2200" dirty="0" smtClean="0"/>
               <a:t>}</a:t>
             </a:r>
+            <a:endParaRPr lang="pt-BR" sz="2200" dirty="0" smtClean="0"/>
           </a:p>
         </p:txBody>
       </p:sp>
@@ -12130,15 +12192,7 @@
                   <a:srgbClr val="FFC000"/>
                 </a:solidFill>
               </a:rPr>
-              <a:t>f1</a:t>
-            </a:r>
-            <a:r>
-              <a:rPr lang="pt-BR" sz="2000" dirty="0" smtClean="0">
-                <a:solidFill>
-                  <a:srgbClr val="FFC000"/>
-                </a:solidFill>
-              </a:rPr>
-              <a:t>.</a:t>
+              <a:t>f1.</a:t>
             </a:r>
             <a:r>
               <a:rPr lang="pt-BR" sz="2000" dirty="0" err="1" smtClean="0">
@@ -12154,7 +12208,7 @@
                   <a:srgbClr val="FFC000"/>
                 </a:solidFill>
               </a:rPr>
-              <a:t>(f2</a:t>
+              <a:t>(f2) </a:t>
             </a:r>
             <a:r>
               <a:rPr lang="pt-BR" sz="2000" dirty="0" smtClean="0">
@@ -12162,15 +12216,19 @@
                   <a:srgbClr val="FFC000"/>
                 </a:solidFill>
               </a:rPr>
-              <a:t>) == 0</a:t>
+              <a:t>&gt; </a:t>
+            </a:r>
+            <a:r>
+              <a:rPr lang="pt-BR" sz="2000" dirty="0" smtClean="0">
+                <a:solidFill>
+                  <a:srgbClr val="FFC000"/>
+                </a:solidFill>
+              </a:rPr>
+              <a:t>0</a:t>
             </a:r>
             <a:r>
               <a:rPr lang="pt-BR" sz="2000" dirty="0" smtClean="0"/>
-              <a:t>) </a:t>
-            </a:r>
-            <a:r>
-              <a:rPr lang="pt-BR" sz="2000" dirty="0" smtClean="0"/>
-              <a:t>{</a:t>
+              <a:t>) {</a:t>
             </a:r>
           </a:p>
           <a:p>
@@ -12193,15 +12251,15 @@
             </a:r>
             <a:r>
               <a:rPr lang="pt-BR" sz="2000" dirty="0" smtClean="0"/>
-              <a:t>("</a:t>
+              <a:t>(“O primeiro </a:t>
             </a:r>
             <a:r>
               <a:rPr lang="pt-BR" sz="2000" dirty="0" err="1" smtClean="0"/>
-              <a:t>Funcionarios</a:t>
+              <a:t>funcionario</a:t>
             </a:r>
             <a:r>
               <a:rPr lang="pt-BR" sz="2000" dirty="0" smtClean="0"/>
-              <a:t> iguais");</a:t>
+              <a:t> é maior");</a:t>
             </a:r>
           </a:p>
           <a:p>
@@ -12256,7 +12314,23 @@
                   <a:srgbClr val="FFC000"/>
                 </a:solidFill>
               </a:rPr>
-              <a:t>(f2) &gt; 0</a:t>
+              <a:t>(f2) </a:t>
+            </a:r>
+            <a:r>
+              <a:rPr lang="pt-BR" sz="2000" dirty="0" smtClean="0">
+                <a:solidFill>
+                  <a:srgbClr val="FFC000"/>
+                </a:solidFill>
+              </a:rPr>
+              <a:t>&lt; </a:t>
+            </a:r>
+            <a:r>
+              <a:rPr lang="pt-BR" sz="2000" dirty="0" smtClean="0">
+                <a:solidFill>
+                  <a:srgbClr val="FFC000"/>
+                </a:solidFill>
+              </a:rPr>
+              <a:t>0</a:t>
             </a:r>
             <a:r>
               <a:rPr lang="pt-BR" sz="2000" dirty="0" smtClean="0"/>
@@ -12283,7 +12357,7 @@
             </a:r>
             <a:r>
               <a:rPr lang="pt-BR" sz="2000" dirty="0" smtClean="0"/>
-              <a:t>(“O primeiro </a:t>
+              <a:t>(“O segundo </a:t>
             </a:r>
             <a:r>
               <a:rPr lang="pt-BR" sz="2000" dirty="0" err="1" smtClean="0"/>
@@ -12337,15 +12411,15 @@
             </a:r>
             <a:r>
               <a:rPr lang="pt-BR" sz="2000" dirty="0" smtClean="0"/>
-              <a:t>(“O segundo </a:t>
+              <a:t>("</a:t>
             </a:r>
             <a:r>
               <a:rPr lang="pt-BR" sz="2000" dirty="0" err="1" smtClean="0"/>
-              <a:t>funcionario</a:t>
+              <a:t>Funcionarios</a:t>
             </a:r>
             <a:r>
               <a:rPr lang="pt-BR" sz="2000" dirty="0" smtClean="0"/>
-              <a:t> é maior");</a:t>
+              <a:t> iguais");</a:t>
             </a:r>
           </a:p>
           <a:p>
@@ -12362,6 +12436,7 @@
               <a:rPr lang="pt-BR" sz="2000" dirty="0" smtClean="0"/>
               <a:t>}</a:t>
             </a:r>
+            <a:endParaRPr lang="pt-BR" sz="2000" dirty="0" smtClean="0"/>
           </a:p>
         </p:txBody>
       </p:sp>
@@ -13585,11 +13660,7 @@
             </a:r>
             <a:r>
               <a:rPr lang="pt-BR" sz="2400" dirty="0" smtClean="0"/>
-              <a:t> </a:t>
-            </a:r>
-            <a:r>
-              <a:rPr lang="pt-BR" sz="2400" dirty="0" smtClean="0"/>
-              <a:t>e no método </a:t>
+              <a:t> e no método </a:t>
             </a:r>
             <a:r>
               <a:rPr lang="pt-BR" sz="2400" dirty="0" smtClean="0">

</xml_diff>

<commit_message>
Redução do conteúdo a ser apresentado nos capítulos 3 (equalse hashcode) e 4 (coleções). Foram excluídos os temas de ordenação: Comparable, Comparator, SortedSet e SortedMap.
</commit_message>
<xml_diff>
--- a/2-Java-Programmer-Modulo-II/09.Capitulo03.pptx
+++ b/2-Java-Programmer-Modulo-II/09.Capitulo03.pptx
@@ -5,7 +5,7 @@
     <p:sldMasterId id="2147483660" r:id="rId1"/>
   </p:sldMasterIdLst>
   <p:notesMasterIdLst>
-    <p:notesMasterId r:id="rId27"/>
+    <p:notesMasterId r:id="rId20"/>
   </p:notesMasterIdLst>
   <p:sldIdLst>
     <p:sldId id="256" r:id="rId2"/>
@@ -24,15 +24,8 @@
     <p:sldId id="263" r:id="rId15"/>
     <p:sldId id="268" r:id="rId16"/>
     <p:sldId id="269" r:id="rId17"/>
-    <p:sldId id="271" r:id="rId18"/>
-    <p:sldId id="283" r:id="rId19"/>
-    <p:sldId id="284" r:id="rId20"/>
-    <p:sldId id="285" r:id="rId21"/>
-    <p:sldId id="286" r:id="rId22"/>
-    <p:sldId id="272" r:id="rId23"/>
-    <p:sldId id="274" r:id="rId24"/>
-    <p:sldId id="275" r:id="rId25"/>
-    <p:sldId id="277" r:id="rId26"/>
+    <p:sldId id="274" r:id="rId18"/>
+    <p:sldId id="277" r:id="rId19"/>
   </p:sldIdLst>
   <p:sldSz cx="9144000" cy="6858000" type="screen4x3"/>
   <p:notesSz cx="6858000" cy="9144000"/>
@@ -273,7 +266,7 @@
               <a:pPr>
                 <a:defRPr/>
               </a:pPr>
-              <a:t>20/5/2012</a:t>
+              <a:t>28/06/2012</a:t>
             </a:fld>
             <a:endParaRPr lang="pt-BR"/>
           </a:p>
@@ -1393,7 +1386,7 @@
       </p:grpSpPr>
       <p:sp>
         <p:nvSpPr>
-          <p:cNvPr id="2" name="Espaço Reservado para Imagem de Slide 1"/>
+          <p:cNvPr id="2" name="Slide Image Placeholder 1"/>
           <p:cNvSpPr>
             <a:spLocks noGrp="1" noRot="1" noChangeAspect="1"/>
           </p:cNvSpPr>
@@ -1405,7 +1398,7 @@
       </p:sp>
       <p:sp>
         <p:nvSpPr>
-          <p:cNvPr id="3" name="Espaço Reservado para Anotações 2"/>
+          <p:cNvPr id="3" name="Notes Placeholder 2"/>
           <p:cNvSpPr>
             <a:spLocks noGrp="1"/>
           </p:cNvSpPr>
@@ -1426,7 +1419,7 @@
       </p:sp>
       <p:sp>
         <p:nvSpPr>
-          <p:cNvPr id="4" name="Espaço Reservado para Número de Slide 3"/>
+          <p:cNvPr id="4" name="Slide Number Placeholder 3"/>
           <p:cNvSpPr>
             <a:spLocks noGrp="1"/>
           </p:cNvSpPr>
@@ -1562,107 +1555,6 @@
 </p:notes>
 </file>
 
-<file path=ppt/notesSlides/notesSlide19.xml><?xml version="1.0" encoding="utf-8"?>
-<p:notes xmlns:a="http://schemas.openxmlformats.org/drawingml/2006/main" xmlns:r="http://schemas.openxmlformats.org/officeDocument/2006/relationships" xmlns:p="http://schemas.openxmlformats.org/presentationml/2006/main">
-  <p:cSld>
-    <p:spTree>
-      <p:nvGrpSpPr>
-        <p:cNvPr id="1" name=""/>
-        <p:cNvGrpSpPr/>
-        <p:nvPr/>
-      </p:nvGrpSpPr>
-      <p:grpSpPr>
-        <a:xfrm>
-          <a:off x="0" y="0"/>
-          <a:ext cx="0" cy="0"/>
-          <a:chOff x="0" y="0"/>
-          <a:chExt cx="0" cy="0"/>
-        </a:xfrm>
-      </p:grpSpPr>
-      <p:sp>
-        <p:nvSpPr>
-          <p:cNvPr id="18434" name="Espaço Reservado para Imagem de Slide 1"/>
-          <p:cNvSpPr>
-            <a:spLocks noGrp="1" noRot="1" noChangeAspect="1" noTextEdit="1"/>
-          </p:cNvSpPr>
-          <p:nvPr>
-            <p:ph type="sldImg"/>
-          </p:nvPr>
-        </p:nvSpPr>
-        <p:spPr bwMode="auto">
-          <a:noFill/>
-          <a:ln>
-            <a:solidFill>
-              <a:srgbClr val="000000"/>
-            </a:solidFill>
-            <a:miter lim="800000"/>
-            <a:headEnd/>
-            <a:tailEnd/>
-          </a:ln>
-        </p:spPr>
-      </p:sp>
-      <p:sp>
-        <p:nvSpPr>
-          <p:cNvPr id="18435" name="Espaço Reservado para Anotações 2"/>
-          <p:cNvSpPr>
-            <a:spLocks noGrp="1"/>
-          </p:cNvSpPr>
-          <p:nvPr>
-            <p:ph type="body" idx="1"/>
-          </p:nvPr>
-        </p:nvSpPr>
-        <p:spPr bwMode="auto">
-          <a:noFill/>
-        </p:spPr>
-        <p:txBody>
-          <a:bodyPr wrap="square" numCol="1" anchor="t" anchorCtr="0" compatLnSpc="1">
-            <a:prstTxWarp prst="textNoShape">
-              <a:avLst/>
-            </a:prstTxWarp>
-          </a:bodyPr>
-          <a:lstStyle/>
-          <a:p>
-            <a:endParaRPr lang="pt-BR" smtClean="0"/>
-          </a:p>
-        </p:txBody>
-      </p:sp>
-      <p:sp>
-        <p:nvSpPr>
-          <p:cNvPr id="4" name="Espaço Reservado para Número de Slide 3"/>
-          <p:cNvSpPr>
-            <a:spLocks noGrp="1"/>
-          </p:cNvSpPr>
-          <p:nvPr>
-            <p:ph type="sldNum" sz="quarter" idx="5"/>
-          </p:nvPr>
-        </p:nvSpPr>
-        <p:spPr/>
-        <p:txBody>
-          <a:bodyPr/>
-          <a:lstStyle/>
-          <a:p>
-            <a:pPr>
-              <a:defRPr/>
-            </a:pPr>
-            <a:fld id="{73B82366-CA9F-4626-95EC-6E81A93A1CAD}" type="slidenum">
-              <a:rPr lang="pt-BR" smtClean="0"/>
-              <a:pPr>
-                <a:defRPr/>
-              </a:pPr>
-              <a:t>19</a:t>
-            </a:fld>
-            <a:endParaRPr lang="pt-BR"/>
-          </a:p>
-        </p:txBody>
-      </p:sp>
-    </p:spTree>
-  </p:cSld>
-  <p:clrMapOvr>
-    <a:masterClrMapping/>
-  </p:clrMapOvr>
-</p:notes>
-</file>
-
 <file path=ppt/notesSlides/notesSlide2.xml><?xml version="1.0" encoding="utf-8"?>
 <p:notes xmlns:a="http://schemas.openxmlformats.org/drawingml/2006/main" xmlns:r="http://schemas.openxmlformats.org/officeDocument/2006/relationships" xmlns:p="http://schemas.openxmlformats.org/presentationml/2006/main">
   <p:cSld>
@@ -1737,570 +1629,6 @@
                 <a:defRPr/>
               </a:pPr>
               <a:t>2</a:t>
-            </a:fld>
-            <a:endParaRPr lang="pt-BR"/>
-          </a:p>
-        </p:txBody>
-      </p:sp>
-    </p:spTree>
-  </p:cSld>
-  <p:clrMapOvr>
-    <a:masterClrMapping/>
-  </p:clrMapOvr>
-</p:notes>
-</file>
-
-<file path=ppt/notesSlides/notesSlide20.xml><?xml version="1.0" encoding="utf-8"?>
-<p:notes xmlns:a="http://schemas.openxmlformats.org/drawingml/2006/main" xmlns:r="http://schemas.openxmlformats.org/officeDocument/2006/relationships" xmlns:p="http://schemas.openxmlformats.org/presentationml/2006/main">
-  <p:cSld>
-    <p:spTree>
-      <p:nvGrpSpPr>
-        <p:cNvPr id="1" name=""/>
-        <p:cNvGrpSpPr/>
-        <p:nvPr/>
-      </p:nvGrpSpPr>
-      <p:grpSpPr>
-        <a:xfrm>
-          <a:off x="0" y="0"/>
-          <a:ext cx="0" cy="0"/>
-          <a:chOff x="0" y="0"/>
-          <a:chExt cx="0" cy="0"/>
-        </a:xfrm>
-      </p:grpSpPr>
-      <p:sp>
-        <p:nvSpPr>
-          <p:cNvPr id="18434" name="Espaço Reservado para Imagem de Slide 1"/>
-          <p:cNvSpPr>
-            <a:spLocks noGrp="1" noRot="1" noChangeAspect="1" noTextEdit="1"/>
-          </p:cNvSpPr>
-          <p:nvPr>
-            <p:ph type="sldImg"/>
-          </p:nvPr>
-        </p:nvSpPr>
-        <p:spPr bwMode="auto">
-          <a:noFill/>
-          <a:ln>
-            <a:solidFill>
-              <a:srgbClr val="000000"/>
-            </a:solidFill>
-            <a:miter lim="800000"/>
-            <a:headEnd/>
-            <a:tailEnd/>
-          </a:ln>
-        </p:spPr>
-      </p:sp>
-      <p:sp>
-        <p:nvSpPr>
-          <p:cNvPr id="18435" name="Espaço Reservado para Anotações 2"/>
-          <p:cNvSpPr>
-            <a:spLocks noGrp="1"/>
-          </p:cNvSpPr>
-          <p:nvPr>
-            <p:ph type="body" idx="1"/>
-          </p:nvPr>
-        </p:nvSpPr>
-        <p:spPr bwMode="auto">
-          <a:noFill/>
-        </p:spPr>
-        <p:txBody>
-          <a:bodyPr wrap="square" numCol="1" anchor="t" anchorCtr="0" compatLnSpc="1">
-            <a:prstTxWarp prst="textNoShape">
-              <a:avLst/>
-            </a:prstTxWarp>
-          </a:bodyPr>
-          <a:lstStyle/>
-          <a:p>
-            <a:endParaRPr lang="pt-BR" smtClean="0"/>
-          </a:p>
-        </p:txBody>
-      </p:sp>
-      <p:sp>
-        <p:nvSpPr>
-          <p:cNvPr id="4" name="Espaço Reservado para Número de Slide 3"/>
-          <p:cNvSpPr>
-            <a:spLocks noGrp="1"/>
-          </p:cNvSpPr>
-          <p:nvPr>
-            <p:ph type="sldNum" sz="quarter" idx="5"/>
-          </p:nvPr>
-        </p:nvSpPr>
-        <p:spPr/>
-        <p:txBody>
-          <a:bodyPr/>
-          <a:lstStyle/>
-          <a:p>
-            <a:pPr>
-              <a:defRPr/>
-            </a:pPr>
-            <a:fld id="{73B82366-CA9F-4626-95EC-6E81A93A1CAD}" type="slidenum">
-              <a:rPr lang="pt-BR" smtClean="0"/>
-              <a:pPr>
-                <a:defRPr/>
-              </a:pPr>
-              <a:t>20</a:t>
-            </a:fld>
-            <a:endParaRPr lang="pt-BR"/>
-          </a:p>
-        </p:txBody>
-      </p:sp>
-    </p:spTree>
-  </p:cSld>
-  <p:clrMapOvr>
-    <a:masterClrMapping/>
-  </p:clrMapOvr>
-</p:notes>
-</file>
-
-<file path=ppt/notesSlides/notesSlide21.xml><?xml version="1.0" encoding="utf-8"?>
-<p:notes xmlns:a="http://schemas.openxmlformats.org/drawingml/2006/main" xmlns:r="http://schemas.openxmlformats.org/officeDocument/2006/relationships" xmlns:p="http://schemas.openxmlformats.org/presentationml/2006/main">
-  <p:cSld>
-    <p:spTree>
-      <p:nvGrpSpPr>
-        <p:cNvPr id="1" name=""/>
-        <p:cNvGrpSpPr/>
-        <p:nvPr/>
-      </p:nvGrpSpPr>
-      <p:grpSpPr>
-        <a:xfrm>
-          <a:off x="0" y="0"/>
-          <a:ext cx="0" cy="0"/>
-          <a:chOff x="0" y="0"/>
-          <a:chExt cx="0" cy="0"/>
-        </a:xfrm>
-      </p:grpSpPr>
-      <p:sp>
-        <p:nvSpPr>
-          <p:cNvPr id="2" name="Espaço Reservado para Imagem de Slide 1"/>
-          <p:cNvSpPr>
-            <a:spLocks noGrp="1" noRot="1" noChangeAspect="1"/>
-          </p:cNvSpPr>
-          <p:nvPr>
-            <p:ph type="sldImg"/>
-          </p:nvPr>
-        </p:nvSpPr>
-        <p:spPr/>
-      </p:sp>
-      <p:sp>
-        <p:nvSpPr>
-          <p:cNvPr id="3" name="Espaço Reservado para Anotações 2"/>
-          <p:cNvSpPr>
-            <a:spLocks noGrp="1"/>
-          </p:cNvSpPr>
-          <p:nvPr>
-            <p:ph type="body" idx="1"/>
-          </p:nvPr>
-        </p:nvSpPr>
-        <p:spPr/>
-        <p:txBody>
-          <a:bodyPr>
-            <a:normAutofit/>
-          </a:bodyPr>
-          <a:lstStyle/>
-          <a:p>
-            <a:endParaRPr lang="pt-BR"/>
-          </a:p>
-        </p:txBody>
-      </p:sp>
-      <p:sp>
-        <p:nvSpPr>
-          <p:cNvPr id="4" name="Espaço Reservado para Número de Slide 3"/>
-          <p:cNvSpPr>
-            <a:spLocks noGrp="1"/>
-          </p:cNvSpPr>
-          <p:nvPr>
-            <p:ph type="sldNum" sz="quarter" idx="10"/>
-          </p:nvPr>
-        </p:nvSpPr>
-        <p:spPr/>
-        <p:txBody>
-          <a:bodyPr/>
-          <a:lstStyle/>
-          <a:p>
-            <a:pPr>
-              <a:defRPr/>
-            </a:pPr>
-            <a:fld id="{4D817394-A7F1-4D84-9DD9-0280878B928F}" type="slidenum">
-              <a:rPr lang="pt-BR" smtClean="0"/>
-              <a:pPr>
-                <a:defRPr/>
-              </a:pPr>
-              <a:t>21</a:t>
-            </a:fld>
-            <a:endParaRPr lang="pt-BR"/>
-          </a:p>
-        </p:txBody>
-      </p:sp>
-    </p:spTree>
-  </p:cSld>
-  <p:clrMapOvr>
-    <a:masterClrMapping/>
-  </p:clrMapOvr>
-</p:notes>
-</file>
-
-<file path=ppt/notesSlides/notesSlide22.xml><?xml version="1.0" encoding="utf-8"?>
-<p:notes xmlns:a="http://schemas.openxmlformats.org/drawingml/2006/main" xmlns:r="http://schemas.openxmlformats.org/officeDocument/2006/relationships" xmlns:p="http://schemas.openxmlformats.org/presentationml/2006/main">
-  <p:cSld>
-    <p:spTree>
-      <p:nvGrpSpPr>
-        <p:cNvPr id="1" name=""/>
-        <p:cNvGrpSpPr/>
-        <p:nvPr/>
-      </p:nvGrpSpPr>
-      <p:grpSpPr>
-        <a:xfrm>
-          <a:off x="0" y="0"/>
-          <a:ext cx="0" cy="0"/>
-          <a:chOff x="0" y="0"/>
-          <a:chExt cx="0" cy="0"/>
-        </a:xfrm>
-      </p:grpSpPr>
-      <p:sp>
-        <p:nvSpPr>
-          <p:cNvPr id="21506" name="Espaço Reservado para Imagem de Slide 1"/>
-          <p:cNvSpPr>
-            <a:spLocks noGrp="1" noRot="1" noChangeAspect="1" noTextEdit="1"/>
-          </p:cNvSpPr>
-          <p:nvPr>
-            <p:ph type="sldImg"/>
-          </p:nvPr>
-        </p:nvSpPr>
-        <p:spPr bwMode="auto">
-          <a:noFill/>
-          <a:ln>
-            <a:solidFill>
-              <a:srgbClr val="000000"/>
-            </a:solidFill>
-            <a:miter lim="800000"/>
-            <a:headEnd/>
-            <a:tailEnd/>
-          </a:ln>
-        </p:spPr>
-      </p:sp>
-      <p:sp>
-        <p:nvSpPr>
-          <p:cNvPr id="21507" name="Espaço Reservado para Anotações 2"/>
-          <p:cNvSpPr>
-            <a:spLocks noGrp="1"/>
-          </p:cNvSpPr>
-          <p:nvPr>
-            <p:ph type="body" idx="1"/>
-          </p:nvPr>
-        </p:nvSpPr>
-        <p:spPr bwMode="auto">
-          <a:noFill/>
-        </p:spPr>
-        <p:txBody>
-          <a:bodyPr wrap="square" numCol="1" anchor="t" anchorCtr="0" compatLnSpc="1">
-            <a:prstTxWarp prst="textNoShape">
-              <a:avLst/>
-            </a:prstTxWarp>
-          </a:bodyPr>
-          <a:lstStyle/>
-          <a:p>
-            <a:endParaRPr lang="pt-BR" smtClean="0"/>
-          </a:p>
-        </p:txBody>
-      </p:sp>
-      <p:sp>
-        <p:nvSpPr>
-          <p:cNvPr id="4" name="Espaço Reservado para Número de Slide 3"/>
-          <p:cNvSpPr>
-            <a:spLocks noGrp="1"/>
-          </p:cNvSpPr>
-          <p:nvPr>
-            <p:ph type="sldNum" sz="quarter" idx="5"/>
-          </p:nvPr>
-        </p:nvSpPr>
-        <p:spPr/>
-        <p:txBody>
-          <a:bodyPr/>
-          <a:lstStyle/>
-          <a:p>
-            <a:pPr>
-              <a:defRPr/>
-            </a:pPr>
-            <a:fld id="{D91855F3-06B9-41BE-AE6B-5E8D84DB7C6D}" type="slidenum">
-              <a:rPr lang="pt-BR" smtClean="0"/>
-              <a:pPr>
-                <a:defRPr/>
-              </a:pPr>
-              <a:t>22</a:t>
-            </a:fld>
-            <a:endParaRPr lang="pt-BR"/>
-          </a:p>
-        </p:txBody>
-      </p:sp>
-    </p:spTree>
-  </p:cSld>
-  <p:clrMapOvr>
-    <a:masterClrMapping/>
-  </p:clrMapOvr>
-</p:notes>
-</file>
-
-<file path=ppt/notesSlides/notesSlide23.xml><?xml version="1.0" encoding="utf-8"?>
-<p:notes xmlns:a="http://schemas.openxmlformats.org/drawingml/2006/main" xmlns:r="http://schemas.openxmlformats.org/officeDocument/2006/relationships" xmlns:p="http://schemas.openxmlformats.org/presentationml/2006/main">
-  <p:cSld>
-    <p:spTree>
-      <p:nvGrpSpPr>
-        <p:cNvPr id="1" name=""/>
-        <p:cNvGrpSpPr/>
-        <p:nvPr/>
-      </p:nvGrpSpPr>
-      <p:grpSpPr>
-        <a:xfrm>
-          <a:off x="0" y="0"/>
-          <a:ext cx="0" cy="0"/>
-          <a:chOff x="0" y="0"/>
-          <a:chExt cx="0" cy="0"/>
-        </a:xfrm>
-      </p:grpSpPr>
-      <p:sp>
-        <p:nvSpPr>
-          <p:cNvPr id="2" name="Slide Image Placeholder 1"/>
-          <p:cNvSpPr>
-            <a:spLocks noGrp="1" noRot="1" noChangeAspect="1"/>
-          </p:cNvSpPr>
-          <p:nvPr>
-            <p:ph type="sldImg"/>
-          </p:nvPr>
-        </p:nvSpPr>
-        <p:spPr/>
-      </p:sp>
-      <p:sp>
-        <p:nvSpPr>
-          <p:cNvPr id="3" name="Notes Placeholder 2"/>
-          <p:cNvSpPr>
-            <a:spLocks noGrp="1"/>
-          </p:cNvSpPr>
-          <p:nvPr>
-            <p:ph type="body" idx="1"/>
-          </p:nvPr>
-        </p:nvSpPr>
-        <p:spPr/>
-        <p:txBody>
-          <a:bodyPr>
-            <a:normAutofit/>
-          </a:bodyPr>
-          <a:lstStyle/>
-          <a:p>
-            <a:endParaRPr lang="pt-BR"/>
-          </a:p>
-        </p:txBody>
-      </p:sp>
-      <p:sp>
-        <p:nvSpPr>
-          <p:cNvPr id="4" name="Slide Number Placeholder 3"/>
-          <p:cNvSpPr>
-            <a:spLocks noGrp="1"/>
-          </p:cNvSpPr>
-          <p:nvPr>
-            <p:ph type="sldNum" sz="quarter" idx="10"/>
-          </p:nvPr>
-        </p:nvSpPr>
-        <p:spPr/>
-        <p:txBody>
-          <a:bodyPr/>
-          <a:lstStyle/>
-          <a:p>
-            <a:pPr>
-              <a:defRPr/>
-            </a:pPr>
-            <a:fld id="{4D817394-A7F1-4D84-9DD9-0280878B928F}" type="slidenum">
-              <a:rPr lang="pt-BR" smtClean="0"/>
-              <a:pPr>
-                <a:defRPr/>
-              </a:pPr>
-              <a:t>23</a:t>
-            </a:fld>
-            <a:endParaRPr lang="pt-BR"/>
-          </a:p>
-        </p:txBody>
-      </p:sp>
-    </p:spTree>
-  </p:cSld>
-  <p:clrMapOvr>
-    <a:masterClrMapping/>
-  </p:clrMapOvr>
-</p:notes>
-</file>
-
-<file path=ppt/notesSlides/notesSlide24.xml><?xml version="1.0" encoding="utf-8"?>
-<p:notes xmlns:a="http://schemas.openxmlformats.org/drawingml/2006/main" xmlns:r="http://schemas.openxmlformats.org/officeDocument/2006/relationships" xmlns:p="http://schemas.openxmlformats.org/presentationml/2006/main">
-  <p:cSld>
-    <p:spTree>
-      <p:nvGrpSpPr>
-        <p:cNvPr id="1" name=""/>
-        <p:cNvGrpSpPr/>
-        <p:nvPr/>
-      </p:nvGrpSpPr>
-      <p:grpSpPr>
-        <a:xfrm>
-          <a:off x="0" y="0"/>
-          <a:ext cx="0" cy="0"/>
-          <a:chOff x="0" y="0"/>
-          <a:chExt cx="0" cy="0"/>
-        </a:xfrm>
-      </p:grpSpPr>
-      <p:sp>
-        <p:nvSpPr>
-          <p:cNvPr id="2" name="Slide Image Placeholder 1"/>
-          <p:cNvSpPr>
-            <a:spLocks noGrp="1" noRot="1" noChangeAspect="1"/>
-          </p:cNvSpPr>
-          <p:nvPr>
-            <p:ph type="sldImg"/>
-          </p:nvPr>
-        </p:nvSpPr>
-        <p:spPr/>
-      </p:sp>
-      <p:sp>
-        <p:nvSpPr>
-          <p:cNvPr id="3" name="Notes Placeholder 2"/>
-          <p:cNvSpPr>
-            <a:spLocks noGrp="1"/>
-          </p:cNvSpPr>
-          <p:nvPr>
-            <p:ph type="body" idx="1"/>
-          </p:nvPr>
-        </p:nvSpPr>
-        <p:spPr/>
-        <p:txBody>
-          <a:bodyPr>
-            <a:normAutofit/>
-          </a:bodyPr>
-          <a:lstStyle/>
-          <a:p>
-            <a:endParaRPr lang="pt-BR"/>
-          </a:p>
-        </p:txBody>
-      </p:sp>
-      <p:sp>
-        <p:nvSpPr>
-          <p:cNvPr id="4" name="Slide Number Placeholder 3"/>
-          <p:cNvSpPr>
-            <a:spLocks noGrp="1"/>
-          </p:cNvSpPr>
-          <p:nvPr>
-            <p:ph type="sldNum" sz="quarter" idx="10"/>
-          </p:nvPr>
-        </p:nvSpPr>
-        <p:spPr/>
-        <p:txBody>
-          <a:bodyPr/>
-          <a:lstStyle/>
-          <a:p>
-            <a:pPr>
-              <a:defRPr/>
-            </a:pPr>
-            <a:fld id="{4D817394-A7F1-4D84-9DD9-0280878B928F}" type="slidenum">
-              <a:rPr lang="pt-BR" smtClean="0"/>
-              <a:pPr>
-                <a:defRPr/>
-              </a:pPr>
-              <a:t>24</a:t>
-            </a:fld>
-            <a:endParaRPr lang="pt-BR"/>
-          </a:p>
-        </p:txBody>
-      </p:sp>
-    </p:spTree>
-  </p:cSld>
-  <p:clrMapOvr>
-    <a:masterClrMapping/>
-  </p:clrMapOvr>
-</p:notes>
-</file>
-
-<file path=ppt/notesSlides/notesSlide25.xml><?xml version="1.0" encoding="utf-8"?>
-<p:notes xmlns:a="http://schemas.openxmlformats.org/drawingml/2006/main" xmlns:r="http://schemas.openxmlformats.org/officeDocument/2006/relationships" xmlns:p="http://schemas.openxmlformats.org/presentationml/2006/main">
-  <p:cSld>
-    <p:spTree>
-      <p:nvGrpSpPr>
-        <p:cNvPr id="1" name=""/>
-        <p:cNvGrpSpPr/>
-        <p:nvPr/>
-      </p:nvGrpSpPr>
-      <p:grpSpPr>
-        <a:xfrm>
-          <a:off x="0" y="0"/>
-          <a:ext cx="0" cy="0"/>
-          <a:chOff x="0" y="0"/>
-          <a:chExt cx="0" cy="0"/>
-        </a:xfrm>
-      </p:grpSpPr>
-      <p:sp>
-        <p:nvSpPr>
-          <p:cNvPr id="18434" name="Espaço Reservado para Imagem de Slide 1"/>
-          <p:cNvSpPr>
-            <a:spLocks noGrp="1" noRot="1" noChangeAspect="1" noTextEdit="1"/>
-          </p:cNvSpPr>
-          <p:nvPr>
-            <p:ph type="sldImg"/>
-          </p:nvPr>
-        </p:nvSpPr>
-        <p:spPr bwMode="auto">
-          <a:noFill/>
-          <a:ln>
-            <a:solidFill>
-              <a:srgbClr val="000000"/>
-            </a:solidFill>
-            <a:miter lim="800000"/>
-            <a:headEnd/>
-            <a:tailEnd/>
-          </a:ln>
-        </p:spPr>
-      </p:sp>
-      <p:sp>
-        <p:nvSpPr>
-          <p:cNvPr id="18435" name="Espaço Reservado para Anotações 2"/>
-          <p:cNvSpPr>
-            <a:spLocks noGrp="1"/>
-          </p:cNvSpPr>
-          <p:nvPr>
-            <p:ph type="body" idx="1"/>
-          </p:nvPr>
-        </p:nvSpPr>
-        <p:spPr bwMode="auto">
-          <a:noFill/>
-        </p:spPr>
-        <p:txBody>
-          <a:bodyPr wrap="square" numCol="1" anchor="t" anchorCtr="0" compatLnSpc="1">
-            <a:prstTxWarp prst="textNoShape">
-              <a:avLst/>
-            </a:prstTxWarp>
-          </a:bodyPr>
-          <a:lstStyle/>
-          <a:p>
-            <a:endParaRPr lang="pt-BR" smtClean="0"/>
-          </a:p>
-        </p:txBody>
-      </p:sp>
-      <p:sp>
-        <p:nvSpPr>
-          <p:cNvPr id="4" name="Espaço Reservado para Número de Slide 3"/>
-          <p:cNvSpPr>
-            <a:spLocks noGrp="1"/>
-          </p:cNvSpPr>
-          <p:nvPr>
-            <p:ph type="sldNum" sz="quarter" idx="5"/>
-          </p:nvPr>
-        </p:nvSpPr>
-        <p:spPr/>
-        <p:txBody>
-          <a:bodyPr/>
-          <a:lstStyle/>
-          <a:p>
-            <a:pPr>
-              <a:defRPr/>
-            </a:pPr>
-            <a:fld id="{73B82366-CA9F-4626-95EC-6E81A93A1CAD}" type="slidenum">
-              <a:rPr lang="pt-BR" smtClean="0"/>
-              <a:pPr>
-                <a:defRPr/>
-              </a:pPr>
-              <a:t>25</a:t>
             </a:fld>
             <a:endParaRPr lang="pt-BR"/>
           </a:p>
@@ -3411,7 +2739,7 @@
               <a:pPr>
                 <a:defRPr/>
               </a:pPr>
-              <a:t>20/5/2012</a:t>
+              <a:t>28/06/2012</a:t>
             </a:fld>
             <a:endParaRPr lang="pt-BR"/>
           </a:p>
@@ -3603,7 +2931,7 @@
               <a:pPr>
                 <a:defRPr/>
               </a:pPr>
-              <a:t>20/5/2012</a:t>
+              <a:t>28/06/2012</a:t>
             </a:fld>
             <a:endParaRPr lang="pt-BR"/>
           </a:p>
@@ -3805,7 +3133,7 @@
               <a:pPr>
                 <a:defRPr/>
               </a:pPr>
-              <a:t>20/5/2012</a:t>
+              <a:t>28/06/2012</a:t>
             </a:fld>
             <a:endParaRPr lang="pt-BR"/>
           </a:p>
@@ -4001,7 +3329,7 @@
               <a:pPr>
                 <a:defRPr/>
               </a:pPr>
-              <a:t>20/5/2012</a:t>
+              <a:t>28/06/2012</a:t>
             </a:fld>
             <a:endParaRPr lang="pt-BR"/>
           </a:p>
@@ -4507,7 +3835,7 @@
               <a:pPr>
                 <a:defRPr/>
               </a:pPr>
-              <a:t>20/5/2012</a:t>
+              <a:t>28/06/2012</a:t>
             </a:fld>
             <a:endParaRPr lang="pt-BR"/>
           </a:p>
@@ -4798,7 +4126,7 @@
               <a:pPr>
                 <a:defRPr/>
               </a:pPr>
-              <a:t>20/5/2012</a:t>
+              <a:t>28/06/2012</a:t>
             </a:fld>
             <a:endParaRPr lang="pt-BR"/>
           </a:p>
@@ -5199,7 +4527,7 @@
               <a:pPr>
                 <a:defRPr/>
               </a:pPr>
-              <a:t>20/5/2012</a:t>
+              <a:t>28/06/2012</a:t>
             </a:fld>
             <a:endParaRPr lang="pt-BR"/>
           </a:p>
@@ -5348,7 +4676,7 @@
               <a:pPr>
                 <a:defRPr/>
               </a:pPr>
-              <a:t>20/5/2012</a:t>
+              <a:t>28/06/2012</a:t>
             </a:fld>
             <a:endParaRPr lang="pt-BR"/>
           </a:p>
@@ -5465,7 +4793,7 @@
               <a:pPr>
                 <a:defRPr/>
               </a:pPr>
-              <a:t>20/5/2012</a:t>
+              <a:t>28/06/2012</a:t>
             </a:fld>
             <a:endParaRPr lang="pt-BR"/>
           </a:p>
@@ -5741,7 +5069,7 @@
               <a:pPr>
                 <a:defRPr/>
               </a:pPr>
-              <a:t>20/5/2012</a:t>
+              <a:t>28/06/2012</a:t>
             </a:fld>
             <a:endParaRPr lang="pt-BR"/>
           </a:p>
@@ -6025,7 +5353,7 @@
               <a:pPr>
                 <a:defRPr/>
               </a:pPr>
-              <a:t>20/5/2012</a:t>
+              <a:t>28/06/2012</a:t>
             </a:fld>
             <a:endParaRPr lang="pt-BR"/>
           </a:p>
@@ -6503,7 +5831,7 @@
               <a:pPr>
                 <a:defRPr/>
               </a:pPr>
-              <a:t>20/5/2012</a:t>
+              <a:t>28/06/2012</a:t>
             </a:fld>
             <a:endParaRPr lang="pt-BR"/>
           </a:p>
@@ -10767,7 +10095,7 @@
       </p:grpSpPr>
       <p:sp>
         <p:nvSpPr>
-          <p:cNvPr id="2" name="Título 1"/>
+          <p:cNvPr id="2" name="Title 1"/>
           <p:cNvSpPr>
             <a:spLocks noGrp="1"/>
           </p:cNvSpPr>
@@ -10782,11 +10110,7 @@
           <a:p>
             <a:r>
               <a:rPr lang="pt-BR" dirty="0" smtClean="0"/>
-              <a:t>A interface </a:t>
-            </a:r>
-            <a:r>
-              <a:rPr lang="pt-BR" dirty="0" err="1" smtClean="0"/>
-              <a:t>Comparable</a:t>
+              <a:t>Exercício</a:t>
             </a:r>
             <a:endParaRPr lang="pt-BR" dirty="0"/>
           </a:p>
@@ -10794,7 +10118,7 @@
       </p:sp>
       <p:sp>
         <p:nvSpPr>
-          <p:cNvPr id="3" name="Espaço Reservado para Conteúdo 2"/>
+          <p:cNvPr id="3" name="Content Placeholder 2"/>
           <p:cNvSpPr>
             <a:spLocks noGrp="1"/>
           </p:cNvSpPr>
@@ -10809,25 +10133,169 @@
           <a:p>
             <a:pPr>
               <a:spcBef>
-                <a:spcPts val="3000"/>
+                <a:spcPts val="2400"/>
               </a:spcBef>
             </a:pPr>
             <a:r>
-              <a:rPr lang="pt-BR" dirty="0" smtClean="0"/>
-              <a:t>Assinala um critéria de comparação entre objetos, permitindo definir se um objeto é maior ou menor que um outro</a:t>
+              <a:rPr lang="pt-BR" sz="2400" dirty="0" smtClean="0"/>
+              <a:t>Crie uma classe denominada </a:t>
+            </a:r>
+            <a:r>
+              <a:rPr lang="pt-BR" sz="2400" dirty="0" smtClean="0">
+                <a:solidFill>
+                  <a:srgbClr val="FFC000"/>
+                </a:solidFill>
+              </a:rPr>
+              <a:t>Produto</a:t>
+            </a:r>
+            <a:r>
+              <a:rPr lang="pt-BR" sz="2400" dirty="0" smtClean="0"/>
+              <a:t> contendo os seguintes atributos:</a:t>
+            </a:r>
+          </a:p>
+          <a:p>
+            <a:pPr lvl="1">
+              <a:spcBef>
+                <a:spcPts val="0"/>
+              </a:spcBef>
+            </a:pPr>
+            <a:endParaRPr lang="pt-BR" sz="2000" dirty="0" smtClean="0"/>
+          </a:p>
+          <a:p>
+            <a:pPr lvl="1">
+              <a:spcBef>
+                <a:spcPts val="0"/>
+              </a:spcBef>
+            </a:pPr>
+            <a:r>
+              <a:rPr lang="pt-BR" sz="2000" dirty="0" smtClean="0">
+                <a:solidFill>
+                  <a:srgbClr val="FFC000"/>
+                </a:solidFill>
+              </a:rPr>
+              <a:t>codigo</a:t>
+            </a:r>
+            <a:r>
+              <a:rPr lang="pt-BR" sz="2000" dirty="0" smtClean="0"/>
+              <a:t>: inteiro</a:t>
+            </a:r>
+          </a:p>
+          <a:p>
+            <a:pPr lvl="1">
+              <a:spcBef>
+                <a:spcPts val="0"/>
+              </a:spcBef>
+            </a:pPr>
+            <a:r>
+              <a:rPr lang="pt-BR" sz="2000" dirty="0" smtClean="0">
+                <a:solidFill>
+                  <a:srgbClr val="FFC000"/>
+                </a:solidFill>
+              </a:rPr>
+              <a:t>descricao</a:t>
+            </a:r>
+            <a:r>
+              <a:rPr lang="pt-BR" sz="2000" dirty="0" smtClean="0"/>
+              <a:t>: String</a:t>
+            </a:r>
+          </a:p>
+          <a:p>
+            <a:pPr lvl="1">
+              <a:spcBef>
+                <a:spcPts val="0"/>
+              </a:spcBef>
+            </a:pPr>
+            <a:r>
+              <a:rPr lang="pt-BR" sz="2000" dirty="0" smtClean="0">
+                <a:solidFill>
+                  <a:srgbClr val="FFC000"/>
+                </a:solidFill>
+              </a:rPr>
+              <a:t>preco</a:t>
+            </a:r>
+            <a:r>
+              <a:rPr lang="pt-BR" sz="2000" dirty="0" smtClean="0"/>
+              <a:t>: double</a:t>
             </a:r>
           </a:p>
           <a:p>
             <a:pPr>
               <a:spcBef>
-                <a:spcPts val="3000"/>
+                <a:spcPts val="2400"/>
               </a:spcBef>
             </a:pPr>
             <a:r>
-              <a:rPr lang="pt-BR" dirty="0" smtClean="0"/>
-              <a:t>Deve ser implementado em classes cujas instâncias serão utilizadas em estruturas de dados ordenáveis.</a:t>
-            </a:r>
-            <a:endParaRPr lang="pt-BR" dirty="0"/>
+              <a:rPr lang="pt-BR" sz="2400" dirty="0" smtClean="0"/>
+              <a:t>Implemente os métodos </a:t>
+            </a:r>
+            <a:r>
+              <a:rPr lang="pt-BR" sz="2400" dirty="0" smtClean="0">
+                <a:solidFill>
+                  <a:srgbClr val="FFC000"/>
+                </a:solidFill>
+              </a:rPr>
+              <a:t>get</a:t>
+            </a:r>
+            <a:r>
+              <a:rPr lang="pt-BR" sz="2400" dirty="0" smtClean="0"/>
+              <a:t> e </a:t>
+            </a:r>
+            <a:r>
+              <a:rPr lang="pt-BR" sz="2400" dirty="0" smtClean="0">
+                <a:solidFill>
+                  <a:srgbClr val="FFC000"/>
+                </a:solidFill>
+              </a:rPr>
+              <a:t>set</a:t>
+            </a:r>
+            <a:r>
+              <a:rPr lang="pt-BR" sz="2400" dirty="0" smtClean="0"/>
+              <a:t> para cada um destes atributos</a:t>
+            </a:r>
+          </a:p>
+          <a:p>
+            <a:pPr>
+              <a:spcBef>
+                <a:spcPts val="2400"/>
+              </a:spcBef>
+            </a:pPr>
+            <a:r>
+              <a:rPr lang="pt-BR" sz="2400" dirty="0" smtClean="0"/>
+              <a:t>Implemente o método </a:t>
+            </a:r>
+            <a:r>
+              <a:rPr lang="pt-BR" sz="2400" dirty="0" smtClean="0">
+                <a:solidFill>
+                  <a:srgbClr val="FFC000"/>
+                </a:solidFill>
+              </a:rPr>
+              <a:t>equals()</a:t>
+            </a:r>
+            <a:r>
+              <a:rPr lang="pt-BR" sz="2400" dirty="0" smtClean="0"/>
+              <a:t> realizando a comparação </a:t>
+            </a:r>
+            <a:r>
+              <a:rPr lang="pt-BR" sz="2400" dirty="0" smtClean="0"/>
+              <a:t>pelo código </a:t>
+            </a:r>
+            <a:r>
+              <a:rPr lang="pt-BR" sz="2400" dirty="0" smtClean="0"/>
+              <a:t>do produto. Em outras palavras, dois produtos serão iguais quando possuírem </a:t>
+            </a:r>
+            <a:r>
+              <a:rPr lang="pt-BR" sz="2400" dirty="0" smtClean="0"/>
+              <a:t>o mesmo c</a:t>
+            </a:r>
+            <a:r>
+              <a:rPr lang="pt-BR" sz="2400" dirty="0" smtClean="0"/>
+              <a:t>ódigo</a:t>
+            </a:r>
+            <a:r>
+              <a:rPr lang="pt-BR" sz="2400" dirty="0" smtClean="0"/>
+              <a:t>.</a:t>
+            </a:r>
+            <a:endParaRPr lang="pt-BR" sz="2400" dirty="0"/>
           </a:p>
         </p:txBody>
       </p:sp>
@@ -10902,83 +10370,74 @@
             <p:ph type="title"/>
           </p:nvPr>
         </p:nvSpPr>
+        <p:spPr/>
+        <p:txBody>
+          <a:bodyPr/>
+          <a:lstStyle/>
+          <a:p>
+            <a:pPr eaLnBrk="1" hangingPunct="1"/>
+            <a:r>
+              <a:rPr lang="pt-BR" dirty="0" smtClean="0"/>
+              <a:t>Exercício (fim)</a:t>
+            </a:r>
+          </a:p>
+        </p:txBody>
+      </p:sp>
+      <p:sp>
+        <p:nvSpPr>
+          <p:cNvPr id="9219" name="Espaço Reservado para Conteúdo 2"/>
+          <p:cNvSpPr>
+            <a:spLocks noGrp="1"/>
+          </p:cNvSpPr>
+          <p:nvPr>
+            <p:ph idx="1"/>
+          </p:nvPr>
+        </p:nvSpPr>
         <p:spPr>
           <a:xfrm>
-            <a:off x="457200" y="274638"/>
-            <a:ext cx="8075240" cy="1143000"/>
+            <a:off x="457200" y="1600200"/>
+            <a:ext cx="8219256" cy="4525963"/>
           </a:xfrm>
         </p:spPr>
         <p:txBody>
           <a:bodyPr/>
           <a:lstStyle/>
           <a:p>
-            <a:pPr eaLnBrk="1" hangingPunct="1"/>
-            <a:r>
-              <a:rPr lang="pt-BR" dirty="0" smtClean="0"/>
-              <a:t>Comparando tipos primitivos</a:t>
-            </a:r>
-          </a:p>
-        </p:txBody>
-      </p:sp>
-      <p:sp>
-        <p:nvSpPr>
-          <p:cNvPr id="9219" name="Espaço Reservado para Conteúdo 2"/>
-          <p:cNvSpPr>
-            <a:spLocks noGrp="1"/>
-          </p:cNvSpPr>
-          <p:nvPr>
-            <p:ph idx="1"/>
-          </p:nvPr>
-        </p:nvSpPr>
-        <p:spPr/>
-        <p:txBody>
-          <a:bodyPr/>
-          <a:lstStyle/>
-          <a:p>
-            <a:r>
-              <a:rPr lang="pt-BR" dirty="0" smtClean="0"/>
-              <a:t>Para comparar valores primitivos utilizamos os operadores relacionais &gt; (maior), &lt; (menor) e outros</a:t>
-            </a:r>
-          </a:p>
-          <a:p>
-            <a:pPr marL="800100" lvl="1" indent="0">
-              <a:lnSpc>
-                <a:spcPct val="90000"/>
-              </a:lnSpc>
-              <a:spcBef>
-                <a:spcPts val="0"/>
-              </a:spcBef>
-              <a:buNone/>
-              <a:tabLst>
-                <a:tab pos="1250950" algn="l"/>
-              </a:tabLst>
-            </a:pPr>
-            <a:endParaRPr lang="pt-BR" sz="2200" dirty="0" smtClean="0">
-              <a:solidFill>
-                <a:srgbClr val="FFC000"/>
-              </a:solidFill>
-            </a:endParaRPr>
-          </a:p>
-          <a:p>
-            <a:pPr marL="800100" lvl="1" indent="0">
-              <a:lnSpc>
-                <a:spcPct val="90000"/>
-              </a:lnSpc>
-              <a:spcBef>
-                <a:spcPts val="0"/>
-              </a:spcBef>
-              <a:buNone/>
-              <a:tabLst>
-                <a:tab pos="1250950" algn="l"/>
-              </a:tabLst>
-            </a:pPr>
+            <a:r>
+              <a:rPr lang="pt-BR" sz="2200" dirty="0" smtClean="0"/>
+              <a:t>Crie </a:t>
+            </a:r>
+            <a:r>
+              <a:rPr lang="pt-BR" sz="2200" dirty="0" smtClean="0"/>
+              <a:t>um </a:t>
+            </a:r>
+            <a:r>
+              <a:rPr lang="pt-BR" sz="2200" smtClean="0"/>
+              <a:t>classe </a:t>
+            </a:r>
+            <a:r>
+              <a:rPr lang="pt-BR" sz="2200" smtClean="0"/>
+              <a:t>chamada </a:t>
+            </a:r>
             <a:r>
               <a:rPr lang="pt-BR" sz="2200" dirty="0" err="1" smtClean="0">
                 <a:solidFill>
                   <a:srgbClr val="FFC000"/>
                 </a:solidFill>
               </a:rPr>
-              <a:t>int</a:t>
+              <a:t>ExercicioEquals</a:t>
+            </a:r>
+            <a:r>
+              <a:rPr lang="pt-BR" sz="2200" dirty="0" smtClean="0"/>
+              <a:t> e no método </a:t>
+            </a:r>
+            <a:r>
+              <a:rPr lang="pt-BR" sz="2200" dirty="0" err="1" smtClean="0">
+                <a:solidFill>
+                  <a:srgbClr val="FFC000"/>
+                </a:solidFill>
+              </a:rPr>
+              <a:t>main</a:t>
             </a:r>
             <a:r>
               <a:rPr lang="pt-BR" sz="2200" dirty="0" smtClean="0">
@@ -10986,263 +10445,155 @@
                   <a:srgbClr val="FFC000"/>
                 </a:solidFill>
               </a:rPr>
-              <a:t> x</a:t>
+              <a:t>()</a:t>
             </a:r>
             <a:r>
               <a:rPr lang="pt-BR" sz="2200" dirty="0" smtClean="0"/>
-              <a:t> = 8;</a:t>
-            </a:r>
-          </a:p>
-          <a:p>
-            <a:pPr marL="800100" lvl="1" indent="0">
-              <a:lnSpc>
-                <a:spcPct val="90000"/>
-              </a:lnSpc>
-              <a:spcBef>
-                <a:spcPts val="0"/>
-              </a:spcBef>
+              <a:t> crie 2 </a:t>
+            </a:r>
+            <a:r>
+              <a:rPr lang="pt-BR" sz="2200" dirty="0" smtClean="0"/>
+              <a:t>instâncias da classe produto conforme abaixo:</a:t>
+            </a:r>
+            <a:endParaRPr lang="pt-BR" sz="2200" u="sng" dirty="0" smtClean="0"/>
+          </a:p>
+          <a:p>
+            <a:pPr marL="450850" indent="0">
               <a:buNone/>
               <a:tabLst>
-                <a:tab pos="1250950" algn="l"/>
+                <a:tab pos="890588" algn="l"/>
               </a:tabLst>
             </a:pPr>
-            <a:r>
-              <a:rPr lang="pt-BR" sz="2200" dirty="0" err="1" smtClean="0">
+            <a:endParaRPr lang="pt-BR" sz="1800" b="1" dirty="0" smtClean="0"/>
+          </a:p>
+          <a:p>
+            <a:pPr marL="450850" lvl="1" indent="0">
+              <a:buNone/>
+              <a:tabLst>
+                <a:tab pos="890588" algn="l"/>
+              </a:tabLst>
+            </a:pPr>
+            <a:r>
+              <a:rPr lang="pt-BR" sz="1800" dirty="0" smtClean="0">
                 <a:solidFill>
                   <a:srgbClr val="FFC000"/>
                 </a:solidFill>
               </a:rPr>
-              <a:t>int</a:t>
-            </a:r>
-            <a:r>
-              <a:rPr lang="pt-BR" sz="2200" dirty="0" smtClean="0">
+              <a:t>Produto p1</a:t>
+            </a:r>
+            <a:r>
+              <a:rPr lang="pt-BR" sz="1800" dirty="0" smtClean="0"/>
+              <a:t> = new Produto(805, “Leite Integral”, </a:t>
+            </a:r>
+            <a:r>
+              <a:rPr lang="pt-BR" sz="1800" dirty="0" smtClean="0"/>
+              <a:t>2.70</a:t>
+            </a:r>
+            <a:r>
+              <a:rPr lang="pt-BR" sz="1800" dirty="0" smtClean="0"/>
+              <a:t>);</a:t>
+            </a:r>
+          </a:p>
+          <a:p>
+            <a:pPr marL="450850" lvl="1" indent="0">
+              <a:buNone/>
+              <a:tabLst>
+                <a:tab pos="890588" algn="l"/>
+              </a:tabLst>
+            </a:pPr>
+            <a:r>
+              <a:rPr lang="pt-BR" sz="1800" dirty="0" smtClean="0">
                 <a:solidFill>
                   <a:srgbClr val="FFC000"/>
                 </a:solidFill>
               </a:rPr>
-              <a:t> y</a:t>
-            </a:r>
-            <a:r>
-              <a:rPr lang="pt-BR" sz="2200" dirty="0" smtClean="0"/>
-              <a:t> = 4 + 6;</a:t>
-            </a:r>
-          </a:p>
-          <a:p>
-            <a:pPr marL="800100" lvl="1" indent="0">
-              <a:lnSpc>
-                <a:spcPct val="90000"/>
-              </a:lnSpc>
-              <a:spcBef>
-                <a:spcPts val="0"/>
-              </a:spcBef>
+              <a:t>Produto p2</a:t>
+            </a:r>
+            <a:r>
+              <a:rPr lang="pt-BR" sz="1800" dirty="0" smtClean="0"/>
+              <a:t> = new Produto(930, </a:t>
+            </a:r>
+            <a:r>
+              <a:rPr lang="pt-BR" sz="1800" dirty="0" smtClean="0"/>
+              <a:t>“Leite Integral”, </a:t>
+            </a:r>
+            <a:r>
+              <a:rPr lang="pt-BR" sz="1800" dirty="0" smtClean="0"/>
+              <a:t>4.80);</a:t>
+            </a:r>
+          </a:p>
+          <a:p>
+            <a:pPr marL="450850" lvl="1" indent="0">
               <a:buNone/>
               <a:tabLst>
-                <a:tab pos="1250950" algn="l"/>
+                <a:tab pos="890588" algn="l"/>
               </a:tabLst>
             </a:pPr>
+            <a:endParaRPr lang="pt-BR" sz="1800" dirty="0" smtClean="0">
+              <a:solidFill>
+                <a:srgbClr val="FFC000"/>
+              </a:solidFill>
+            </a:endParaRPr>
+          </a:p>
+          <a:p>
+            <a:r>
+              <a:rPr lang="pt-BR" sz="2200" dirty="0" smtClean="0"/>
+              <a:t>Realize a comparação entre estes objetos </a:t>
+            </a:r>
+            <a:r>
+              <a:rPr lang="pt-BR" sz="2200" dirty="0" smtClean="0"/>
+              <a:t>através do método </a:t>
+            </a:r>
+            <a:r>
+              <a:rPr lang="pt-BR" sz="2200" dirty="0" err="1" smtClean="0"/>
+              <a:t>equals</a:t>
+            </a:r>
+            <a:r>
+              <a:rPr lang="pt-BR" sz="2200" dirty="0" smtClean="0"/>
+              <a:t>() </a:t>
+            </a:r>
+            <a:r>
+              <a:rPr lang="pt-BR" sz="2200" dirty="0" smtClean="0"/>
+              <a:t>para verificar se eles são iguais exibindo o texto “</a:t>
+            </a:r>
+            <a:r>
+              <a:rPr lang="pt-BR" sz="2200" u="sng" dirty="0" smtClean="0"/>
+              <a:t>Objetos iguais</a:t>
+            </a:r>
+            <a:r>
+              <a:rPr lang="pt-BR" sz="2200" dirty="0" smtClean="0"/>
+              <a:t>” ou “</a:t>
+            </a:r>
+            <a:r>
+              <a:rPr lang="pt-BR" sz="2200" u="sng" dirty="0" smtClean="0"/>
+              <a:t>Objetos diferentes</a:t>
+            </a:r>
+            <a:r>
+              <a:rPr lang="pt-BR" sz="2200" dirty="0" smtClean="0"/>
+              <a:t>” conforme o resultado.</a:t>
+            </a:r>
+          </a:p>
+          <a:p>
             <a:endParaRPr lang="pt-BR" sz="2200" dirty="0" smtClean="0"/>
           </a:p>
           <a:p>
-            <a:pPr marL="800100" lvl="1" indent="0">
-              <a:lnSpc>
-                <a:spcPct val="90000"/>
-              </a:lnSpc>
-              <a:spcBef>
-                <a:spcPts val="0"/>
-              </a:spcBef>
-              <a:buNone/>
-              <a:tabLst>
-                <a:tab pos="1250950" algn="l"/>
-              </a:tabLst>
-            </a:pPr>
+            <a:r>
+              <a:rPr lang="pt-BR" sz="2200" dirty="0" smtClean="0"/>
+              <a:t>Tro</a:t>
+            </a:r>
+            <a:r>
+              <a:rPr lang="pt-BR" sz="2200" dirty="0" smtClean="0"/>
+              <a:t>que o código do segundo objeto também para o valor 805 e em seguida </a:t>
+            </a:r>
             <a:r>
               <a:rPr lang="pt-BR" sz="2200" dirty="0" err="1" smtClean="0"/>
-              <a:t>if</a:t>
+              <a:t>re-execute</a:t>
             </a:r>
             <a:r>
               <a:rPr lang="pt-BR" sz="2200" dirty="0" smtClean="0"/>
-              <a:t> (</a:t>
-            </a:r>
-            <a:r>
-              <a:rPr lang="pt-BR" sz="2200" dirty="0" smtClean="0">
-                <a:solidFill>
-                  <a:srgbClr val="FFC000"/>
-                </a:solidFill>
-              </a:rPr>
-              <a:t>x == y</a:t>
-            </a:r>
-            <a:r>
-              <a:rPr lang="pt-BR" sz="2200" dirty="0" smtClean="0"/>
-              <a:t>) {</a:t>
-            </a:r>
-          </a:p>
-          <a:p>
-            <a:pPr marL="800100" lvl="1" indent="0">
-              <a:lnSpc>
-                <a:spcPct val="90000"/>
-              </a:lnSpc>
-              <a:spcBef>
-                <a:spcPts val="0"/>
-              </a:spcBef>
-              <a:buNone/>
-              <a:tabLst>
-                <a:tab pos="1250950" algn="l"/>
-              </a:tabLst>
-            </a:pPr>
-            <a:r>
-              <a:rPr lang="pt-BR" sz="2200" dirty="0" smtClean="0"/>
-              <a:t>	System.</a:t>
-            </a:r>
-            <a:r>
-              <a:rPr lang="pt-BR" sz="2200" dirty="0" err="1" smtClean="0"/>
-              <a:t>out.println</a:t>
-            </a:r>
-            <a:r>
-              <a:rPr lang="pt-BR" sz="2200" dirty="0" smtClean="0"/>
-              <a:t>("Valores iguais.");</a:t>
-            </a:r>
-          </a:p>
-          <a:p>
-            <a:pPr marL="800100" lvl="1" indent="0">
-              <a:lnSpc>
-                <a:spcPct val="90000"/>
-              </a:lnSpc>
-              <a:spcBef>
-                <a:spcPts val="0"/>
-              </a:spcBef>
-              <a:buNone/>
-              <a:tabLst>
-                <a:tab pos="1250950" algn="l"/>
-              </a:tabLst>
-            </a:pPr>
-            <a:r>
-              <a:rPr lang="pt-BR" sz="2200" dirty="0" smtClean="0"/>
-              <a:t>} </a:t>
-            </a:r>
-            <a:r>
-              <a:rPr lang="pt-BR" sz="2200" dirty="0" err="1" smtClean="0"/>
-              <a:t>else</a:t>
-            </a:r>
-            <a:r>
-              <a:rPr lang="pt-BR" sz="2200" dirty="0" smtClean="0"/>
-              <a:t> </a:t>
-            </a:r>
-            <a:r>
-              <a:rPr lang="pt-BR" sz="2200" dirty="0" err="1" smtClean="0"/>
-              <a:t>if</a:t>
-            </a:r>
-            <a:r>
-              <a:rPr lang="pt-BR" sz="2200" dirty="0" smtClean="0"/>
-              <a:t> (</a:t>
-            </a:r>
-            <a:r>
-              <a:rPr lang="pt-BR" sz="2200" dirty="0" smtClean="0">
-                <a:solidFill>
-                  <a:srgbClr val="FFC000"/>
-                </a:solidFill>
-              </a:rPr>
-              <a:t>x &gt; y</a:t>
-            </a:r>
-            <a:r>
-              <a:rPr lang="pt-BR" sz="2200" dirty="0" smtClean="0"/>
-              <a:t>) {</a:t>
-            </a:r>
-          </a:p>
-          <a:p>
-            <a:pPr marL="800100" lvl="1" indent="0">
-              <a:lnSpc>
-                <a:spcPct val="90000"/>
-              </a:lnSpc>
-              <a:spcBef>
-                <a:spcPts val="0"/>
-              </a:spcBef>
-              <a:buNone/>
-              <a:tabLst>
-                <a:tab pos="1250950" algn="l"/>
-              </a:tabLst>
-            </a:pPr>
-            <a:r>
-              <a:rPr lang="pt-BR" sz="2200" dirty="0" smtClean="0"/>
-              <a:t>	System.</a:t>
-            </a:r>
-            <a:r>
-              <a:rPr lang="pt-BR" sz="2200" dirty="0" err="1" smtClean="0"/>
-              <a:t>out.println</a:t>
-            </a:r>
-            <a:r>
-              <a:rPr lang="pt-BR" sz="2200" dirty="0" smtClean="0"/>
-              <a:t>(“O primeiro valor é maior.");</a:t>
-            </a:r>
-          </a:p>
-          <a:p>
-            <a:pPr marL="800100" lvl="1" indent="0">
-              <a:lnSpc>
-                <a:spcPct val="90000"/>
-              </a:lnSpc>
-              <a:spcBef>
-                <a:spcPts val="0"/>
-              </a:spcBef>
-              <a:buNone/>
-              <a:tabLst>
-                <a:tab pos="1250950" algn="l"/>
-              </a:tabLst>
-            </a:pPr>
-            <a:r>
-              <a:rPr lang="pt-BR" sz="2200" dirty="0" smtClean="0"/>
-              <a:t>} </a:t>
-            </a:r>
-            <a:r>
-              <a:rPr lang="pt-BR" sz="2200" dirty="0" err="1" smtClean="0"/>
-              <a:t>else</a:t>
-            </a:r>
-            <a:r>
-              <a:rPr lang="pt-BR" sz="2200" dirty="0" smtClean="0"/>
-              <a:t> {</a:t>
-            </a:r>
-          </a:p>
-          <a:p>
-            <a:pPr marL="800100" lvl="1" indent="0">
-              <a:lnSpc>
-                <a:spcPct val="90000"/>
-              </a:lnSpc>
-              <a:spcBef>
-                <a:spcPts val="0"/>
-              </a:spcBef>
-              <a:buNone/>
-              <a:tabLst>
-                <a:tab pos="1250950" algn="l"/>
-              </a:tabLst>
-            </a:pPr>
-            <a:r>
-              <a:rPr lang="pt-BR" sz="2200" dirty="0" smtClean="0"/>
-              <a:t>	System.</a:t>
-            </a:r>
-            <a:r>
-              <a:rPr lang="pt-BR" sz="2200" dirty="0" err="1" smtClean="0"/>
-              <a:t>out.println</a:t>
-            </a:r>
-            <a:r>
-              <a:rPr lang="pt-BR" sz="2200" dirty="0" smtClean="0"/>
-              <a:t>(“O segundo valor é maior.");</a:t>
-            </a:r>
-          </a:p>
-          <a:p>
-            <a:pPr marL="800100" lvl="1" indent="0">
-              <a:lnSpc>
-                <a:spcPct val="90000"/>
-              </a:lnSpc>
-              <a:spcBef>
-                <a:spcPts val="0"/>
-              </a:spcBef>
-              <a:buNone/>
-              <a:tabLst>
-                <a:tab pos="1250950" algn="l"/>
-              </a:tabLst>
-            </a:pPr>
-            <a:r>
-              <a:rPr lang="pt-BR" sz="2200" dirty="0" smtClean="0"/>
-              <a:t>}</a:t>
-            </a:r>
+              <a:t> a aplicação</a:t>
+            </a:r>
+            <a:endParaRPr lang="pt-BR" sz="2200" dirty="0" smtClean="0"/>
           </a:p>
         </p:txBody>
       </p:sp>
@@ -11270,408 +10621,6 @@
                 <a:defRPr/>
               </a:pPr>
               <a:t>18</a:t>
-            </a:fld>
-            <a:endParaRPr lang="pt-BR"/>
-          </a:p>
-        </p:txBody>
-      </p:sp>
-    </p:spTree>
-  </p:cSld>
-  <p:clrMapOvr>
-    <a:masterClrMapping/>
-  </p:clrMapOvr>
-  <p:timing>
-    <p:tnLst>
-      <p:par>
-        <p:cTn id="1" dur="indefinite" restart="never" nodeType="tmRoot"/>
-      </p:par>
-    </p:tnLst>
-  </p:timing>
-</p:sld>
-</file>
-
-<file path=ppt/slides/slide19.xml><?xml version="1.0" encoding="utf-8"?>
-<p:sld xmlns:a="http://schemas.openxmlformats.org/drawingml/2006/main" xmlns:r="http://schemas.openxmlformats.org/officeDocument/2006/relationships" xmlns:p="http://schemas.openxmlformats.org/presentationml/2006/main">
-  <p:cSld>
-    <p:spTree>
-      <p:nvGrpSpPr>
-        <p:cNvPr id="1" name=""/>
-        <p:cNvGrpSpPr/>
-        <p:nvPr/>
-      </p:nvGrpSpPr>
-      <p:grpSpPr>
-        <a:xfrm>
-          <a:off x="0" y="0"/>
-          <a:ext cx="0" cy="0"/>
-          <a:chOff x="0" y="0"/>
-          <a:chExt cx="0" cy="0"/>
-        </a:xfrm>
-      </p:grpSpPr>
-      <p:sp>
-        <p:nvSpPr>
-          <p:cNvPr id="9218" name="Título 1"/>
-          <p:cNvSpPr>
-            <a:spLocks noGrp="1"/>
-          </p:cNvSpPr>
-          <p:nvPr>
-            <p:ph type="title"/>
-          </p:nvPr>
-        </p:nvSpPr>
-        <p:spPr/>
-        <p:txBody>
-          <a:bodyPr/>
-          <a:lstStyle/>
-          <a:p>
-            <a:pPr eaLnBrk="1" hangingPunct="1"/>
-            <a:r>
-              <a:rPr lang="pt-BR" dirty="0" smtClean="0"/>
-              <a:t>Comparando Strings</a:t>
-            </a:r>
-          </a:p>
-        </p:txBody>
-      </p:sp>
-      <p:sp>
-        <p:nvSpPr>
-          <p:cNvPr id="9219" name="Espaço Reservado para Conteúdo 2"/>
-          <p:cNvSpPr>
-            <a:spLocks noGrp="1"/>
-          </p:cNvSpPr>
-          <p:nvPr>
-            <p:ph idx="1"/>
-          </p:nvPr>
-        </p:nvSpPr>
-        <p:spPr>
-          <a:xfrm>
-            <a:off x="457200" y="1600200"/>
-            <a:ext cx="7643192" cy="4525963"/>
-          </a:xfrm>
-        </p:spPr>
-        <p:txBody>
-          <a:bodyPr/>
-          <a:lstStyle/>
-          <a:p>
-            <a:r>
-              <a:rPr lang="pt-BR" dirty="0" smtClean="0"/>
-              <a:t>Para a comparação de valores String utilizamos o método </a:t>
-            </a:r>
-            <a:r>
-              <a:rPr lang="pt-BR" u="sng" dirty="0" err="1" smtClean="0"/>
-              <a:t>compareTo</a:t>
-            </a:r>
-            <a:r>
-              <a:rPr lang="pt-BR" u="sng" dirty="0" smtClean="0"/>
-              <a:t>()</a:t>
-            </a:r>
-          </a:p>
-          <a:p>
-            <a:pPr marL="895350" lvl="1" indent="0">
-              <a:spcBef>
-                <a:spcPts val="0"/>
-              </a:spcBef>
-              <a:buNone/>
-              <a:tabLst>
-                <a:tab pos="1430338" algn="l"/>
-              </a:tabLst>
-            </a:pPr>
-            <a:endParaRPr lang="pt-BR" sz="2200" dirty="0" smtClean="0"/>
-          </a:p>
-          <a:p>
-            <a:pPr marL="895350" lvl="1" indent="0">
-              <a:spcBef>
-                <a:spcPts val="0"/>
-              </a:spcBef>
-              <a:buNone/>
-              <a:tabLst>
-                <a:tab pos="1430338" algn="l"/>
-              </a:tabLst>
-            </a:pPr>
-            <a:r>
-              <a:rPr lang="pt-BR" sz="2200" dirty="0" smtClean="0">
-                <a:solidFill>
-                  <a:srgbClr val="FFC000"/>
-                </a:solidFill>
-              </a:rPr>
-              <a:t>String valor1</a:t>
-            </a:r>
-            <a:r>
-              <a:rPr lang="pt-BR" sz="2200" dirty="0" smtClean="0"/>
-              <a:t> = “Manuel";</a:t>
-            </a:r>
-          </a:p>
-          <a:p>
-            <a:pPr marL="895350" lvl="1" indent="0">
-              <a:spcBef>
-                <a:spcPts val="0"/>
-              </a:spcBef>
-              <a:buNone/>
-              <a:tabLst>
-                <a:tab pos="1430338" algn="l"/>
-              </a:tabLst>
-            </a:pPr>
-            <a:r>
-              <a:rPr lang="pt-BR" sz="2200" dirty="0" smtClean="0">
-                <a:solidFill>
-                  <a:srgbClr val="FFC000"/>
-                </a:solidFill>
-              </a:rPr>
-              <a:t>String valor2</a:t>
-            </a:r>
-            <a:r>
-              <a:rPr lang="pt-BR" sz="2200" dirty="0" smtClean="0"/>
-              <a:t> = “Joaquim”;</a:t>
-            </a:r>
-          </a:p>
-          <a:p>
-            <a:pPr marL="895350" lvl="1" indent="0">
-              <a:spcBef>
-                <a:spcPts val="0"/>
-              </a:spcBef>
-              <a:buNone/>
-              <a:tabLst>
-                <a:tab pos="1430338" algn="l"/>
-              </a:tabLst>
-            </a:pPr>
-            <a:endParaRPr lang="pt-BR" sz="2200" dirty="0" smtClean="0"/>
-          </a:p>
-          <a:p>
-            <a:pPr marL="895350" lvl="1" indent="0">
-              <a:spcBef>
-                <a:spcPts val="0"/>
-              </a:spcBef>
-              <a:buNone/>
-              <a:tabLst>
-                <a:tab pos="1430338" algn="l"/>
-              </a:tabLst>
-            </a:pPr>
-            <a:r>
-              <a:rPr lang="pt-BR" sz="2200" dirty="0" err="1" smtClean="0"/>
-              <a:t>if</a:t>
-            </a:r>
-            <a:r>
-              <a:rPr lang="pt-BR" sz="2200" dirty="0" smtClean="0"/>
-              <a:t> (</a:t>
-            </a:r>
-            <a:r>
-              <a:rPr lang="pt-BR" sz="2200" dirty="0" smtClean="0">
-                <a:solidFill>
-                  <a:srgbClr val="FFC000"/>
-                </a:solidFill>
-              </a:rPr>
-              <a:t>valor1.</a:t>
-            </a:r>
-            <a:r>
-              <a:rPr lang="pt-BR" sz="2200" dirty="0" err="1" smtClean="0">
-                <a:solidFill>
-                  <a:srgbClr val="FFC000"/>
-                </a:solidFill>
-              </a:rPr>
-              <a:t>compareTo</a:t>
-            </a:r>
-            <a:r>
-              <a:rPr lang="pt-BR" sz="2200" dirty="0" smtClean="0">
-                <a:solidFill>
-                  <a:srgbClr val="FFC000"/>
-                </a:solidFill>
-              </a:rPr>
-              <a:t>(valor2) &gt; 0</a:t>
-            </a:r>
-            <a:r>
-              <a:rPr lang="pt-BR" sz="2200" dirty="0" smtClean="0"/>
-              <a:t>) {</a:t>
-            </a:r>
-          </a:p>
-          <a:p>
-            <a:pPr marL="895350" lvl="1" indent="0">
-              <a:spcBef>
-                <a:spcPts val="0"/>
-              </a:spcBef>
-              <a:buNone/>
-              <a:tabLst>
-                <a:tab pos="1430338" algn="l"/>
-              </a:tabLst>
-            </a:pPr>
-            <a:r>
-              <a:rPr lang="pt-BR" sz="2200" dirty="0" smtClean="0"/>
-              <a:t>	System.</a:t>
-            </a:r>
-            <a:r>
-              <a:rPr lang="pt-BR" sz="2200" dirty="0" err="1" smtClean="0"/>
-              <a:t>out.println</a:t>
-            </a:r>
-            <a:r>
-              <a:rPr lang="pt-BR" sz="2200" dirty="0" smtClean="0"/>
-              <a:t>(“O primeiro String é maior");</a:t>
-            </a:r>
-          </a:p>
-          <a:p>
-            <a:pPr marL="895350" lvl="1" indent="0">
-              <a:spcBef>
-                <a:spcPts val="0"/>
-              </a:spcBef>
-              <a:buNone/>
-              <a:tabLst>
-                <a:tab pos="1430338" algn="l"/>
-              </a:tabLst>
-            </a:pPr>
-            <a:r>
-              <a:rPr lang="pt-BR" sz="2200" dirty="0" smtClean="0"/>
-              <a:t>} </a:t>
-            </a:r>
-            <a:r>
-              <a:rPr lang="pt-BR" sz="2200" dirty="0" err="1" smtClean="0"/>
-              <a:t>else</a:t>
-            </a:r>
-            <a:r>
-              <a:rPr lang="pt-BR" sz="2200" dirty="0" smtClean="0"/>
-              <a:t> </a:t>
-            </a:r>
-            <a:r>
-              <a:rPr lang="pt-BR" sz="2200" dirty="0" err="1" smtClean="0"/>
-              <a:t>if</a:t>
-            </a:r>
-            <a:r>
-              <a:rPr lang="pt-BR" sz="2200" dirty="0" smtClean="0"/>
-              <a:t> (</a:t>
-            </a:r>
-            <a:r>
-              <a:rPr lang="pt-BR" sz="2200" dirty="0" smtClean="0">
-                <a:solidFill>
-                  <a:srgbClr val="FFC000"/>
-                </a:solidFill>
-              </a:rPr>
-              <a:t>valor1.</a:t>
-            </a:r>
-            <a:r>
-              <a:rPr lang="pt-BR" sz="2200" dirty="0" err="1" smtClean="0">
-                <a:solidFill>
-                  <a:srgbClr val="FFC000"/>
-                </a:solidFill>
-              </a:rPr>
-              <a:t>compareTo</a:t>
-            </a:r>
-            <a:r>
-              <a:rPr lang="pt-BR" sz="2200" dirty="0" smtClean="0">
-                <a:solidFill>
-                  <a:srgbClr val="FFC000"/>
-                </a:solidFill>
-              </a:rPr>
-              <a:t>(valor2) &lt; 0</a:t>
-            </a:r>
-            <a:r>
-              <a:rPr lang="pt-BR" sz="2200" dirty="0" smtClean="0"/>
-              <a:t>) {</a:t>
-            </a:r>
-          </a:p>
-          <a:p>
-            <a:pPr marL="895350" lvl="1" indent="0">
-              <a:spcBef>
-                <a:spcPts val="0"/>
-              </a:spcBef>
-              <a:buNone/>
-              <a:tabLst>
-                <a:tab pos="1430338" algn="l"/>
-              </a:tabLst>
-            </a:pPr>
-            <a:r>
-              <a:rPr lang="pt-BR" sz="2200" dirty="0" smtClean="0"/>
-              <a:t>	System.</a:t>
-            </a:r>
-            <a:r>
-              <a:rPr lang="pt-BR" sz="2200" dirty="0" err="1" smtClean="0"/>
-              <a:t>out.println</a:t>
-            </a:r>
-            <a:r>
-              <a:rPr lang="pt-BR" sz="2200" dirty="0" smtClean="0"/>
-              <a:t>(“O segundo String é maior");</a:t>
-            </a:r>
-          </a:p>
-          <a:p>
-            <a:pPr marL="895350" lvl="1" indent="0">
-              <a:spcBef>
-                <a:spcPts val="0"/>
-              </a:spcBef>
-              <a:buNone/>
-              <a:tabLst>
-                <a:tab pos="1430338" algn="l"/>
-              </a:tabLst>
-            </a:pPr>
-            <a:r>
-              <a:rPr lang="pt-BR" sz="2200" dirty="0" smtClean="0"/>
-              <a:t>} </a:t>
-            </a:r>
-            <a:r>
-              <a:rPr lang="pt-BR" sz="2200" dirty="0" err="1" smtClean="0"/>
-              <a:t>else</a:t>
-            </a:r>
-            <a:r>
-              <a:rPr lang="pt-BR" sz="2200" dirty="0" smtClean="0"/>
-              <a:t> {</a:t>
-            </a:r>
-          </a:p>
-          <a:p>
-            <a:pPr marL="895350" lvl="1" indent="0">
-              <a:spcBef>
-                <a:spcPts val="0"/>
-              </a:spcBef>
-              <a:buNone/>
-              <a:tabLst>
-                <a:tab pos="1430338" algn="l"/>
-              </a:tabLst>
-            </a:pPr>
-            <a:r>
-              <a:rPr lang="pt-BR" sz="2200" dirty="0" smtClean="0"/>
-              <a:t>	System.</a:t>
-            </a:r>
-            <a:r>
-              <a:rPr lang="pt-BR" sz="2200" dirty="0" err="1" smtClean="0"/>
-              <a:t>out.println</a:t>
-            </a:r>
-            <a:r>
-              <a:rPr lang="pt-BR" sz="2200" dirty="0" smtClean="0"/>
-              <a:t>("Strings iguais");</a:t>
-            </a:r>
-          </a:p>
-          <a:p>
-            <a:pPr marL="895350" lvl="1" indent="0">
-              <a:spcBef>
-                <a:spcPts val="0"/>
-              </a:spcBef>
-              <a:buNone/>
-              <a:tabLst>
-                <a:tab pos="1430338" algn="l"/>
-              </a:tabLst>
-            </a:pPr>
-            <a:r>
-              <a:rPr lang="pt-BR" sz="2200" dirty="0" smtClean="0"/>
-              <a:t>}</a:t>
-            </a:r>
-          </a:p>
-        </p:txBody>
-      </p:sp>
-      <p:sp>
-        <p:nvSpPr>
-          <p:cNvPr id="4" name="Espaço Reservado para Número de Slide 3"/>
-          <p:cNvSpPr>
-            <a:spLocks noGrp="1"/>
-          </p:cNvSpPr>
-          <p:nvPr>
-            <p:ph type="sldNum" sz="quarter" idx="12"/>
-          </p:nvPr>
-        </p:nvSpPr>
-        <p:spPr/>
-        <p:txBody>
-          <a:bodyPr/>
-          <a:lstStyle/>
-          <a:p>
-            <a:pPr>
-              <a:defRPr/>
-            </a:pPr>
-            <a:fld id="{6AC7DC48-89D4-446D-B83C-6D0DD696F928}" type="slidenum">
-              <a:rPr lang="pt-BR" smtClean="0"/>
-              <a:pPr>
-                <a:defRPr/>
-              </a:pPr>
-              <a:t>19</a:t>
             </a:fld>
             <a:endParaRPr lang="pt-BR"/>
           </a:p>
@@ -11822,29 +10771,7 @@
               <a:rPr lang="pt-BR" sz="2800" dirty="0" smtClean="0"/>
               <a:t>()</a:t>
             </a:r>
-          </a:p>
-          <a:p>
-            <a:pPr eaLnBrk="1" hangingPunct="1"/>
-            <a:r>
-              <a:rPr lang="pt-BR" sz="2800" dirty="0" smtClean="0"/>
-              <a:t>A interface </a:t>
-            </a:r>
-            <a:r>
-              <a:rPr lang="pt-BR" sz="2800" dirty="0" err="1" smtClean="0"/>
-              <a:t>Comparable</a:t>
-            </a:r>
-            <a:r>
-              <a:rPr lang="pt-BR" sz="2800" dirty="0" smtClean="0"/>
-              <a:t> e o método </a:t>
-            </a:r>
-            <a:r>
-              <a:rPr lang="pt-BR" sz="2800" dirty="0" err="1" smtClean="0"/>
-              <a:t>compareTo</a:t>
-            </a:r>
-            <a:r>
-              <a:rPr lang="pt-BR" sz="2800" dirty="0" smtClean="0"/>
-              <a:t>()</a:t>
-            </a:r>
+            <a:endParaRPr lang="pt-BR" sz="2800" dirty="0" smtClean="0"/>
           </a:p>
         </p:txBody>
       </p:sp>
@@ -11872,1826 +10799,6 @@
                 <a:defRPr/>
               </a:pPr>
               <a:t>2</a:t>
-            </a:fld>
-            <a:endParaRPr lang="pt-BR"/>
-          </a:p>
-        </p:txBody>
-      </p:sp>
-    </p:spTree>
-  </p:cSld>
-  <p:clrMapOvr>
-    <a:masterClrMapping/>
-  </p:clrMapOvr>
-  <p:timing>
-    <p:tnLst>
-      <p:par>
-        <p:cTn id="1" dur="indefinite" restart="never" nodeType="tmRoot"/>
-      </p:par>
-    </p:tnLst>
-  </p:timing>
-</p:sld>
-</file>
-
-<file path=ppt/slides/slide20.xml><?xml version="1.0" encoding="utf-8"?>
-<p:sld xmlns:a="http://schemas.openxmlformats.org/drawingml/2006/main" xmlns:r="http://schemas.openxmlformats.org/officeDocument/2006/relationships" xmlns:p="http://schemas.openxmlformats.org/presentationml/2006/main">
-  <p:cSld>
-    <p:spTree>
-      <p:nvGrpSpPr>
-        <p:cNvPr id="1" name=""/>
-        <p:cNvGrpSpPr/>
-        <p:nvPr/>
-      </p:nvGrpSpPr>
-      <p:grpSpPr>
-        <a:xfrm>
-          <a:off x="0" y="0"/>
-          <a:ext cx="0" cy="0"/>
-          <a:chOff x="0" y="0"/>
-          <a:chExt cx="0" cy="0"/>
-        </a:xfrm>
-      </p:grpSpPr>
-      <p:sp>
-        <p:nvSpPr>
-          <p:cNvPr id="9218" name="Título 1"/>
-          <p:cNvSpPr>
-            <a:spLocks noGrp="1"/>
-          </p:cNvSpPr>
-          <p:nvPr>
-            <p:ph type="title"/>
-          </p:nvPr>
-        </p:nvSpPr>
-        <p:spPr>
-          <a:xfrm>
-            <a:off x="457200" y="274638"/>
-            <a:ext cx="8147248" cy="1143000"/>
-          </a:xfrm>
-        </p:spPr>
-        <p:txBody>
-          <a:bodyPr/>
-          <a:lstStyle/>
-          <a:p>
-            <a:pPr eaLnBrk="1" hangingPunct="1"/>
-            <a:r>
-              <a:rPr lang="pt-BR" dirty="0" smtClean="0"/>
-              <a:t>Comparando outros objetos</a:t>
-            </a:r>
-          </a:p>
-        </p:txBody>
-      </p:sp>
-      <p:sp>
-        <p:nvSpPr>
-          <p:cNvPr id="9219" name="Espaço Reservado para Conteúdo 2"/>
-          <p:cNvSpPr>
-            <a:spLocks noGrp="1"/>
-          </p:cNvSpPr>
-          <p:nvPr>
-            <p:ph idx="1"/>
-          </p:nvPr>
-        </p:nvSpPr>
-        <p:spPr>
-          <a:xfrm>
-            <a:off x="457200" y="1600200"/>
-            <a:ext cx="8147248" cy="4525963"/>
-          </a:xfrm>
-        </p:spPr>
-        <p:txBody>
-          <a:bodyPr/>
-          <a:lstStyle/>
-          <a:p>
-            <a:r>
-              <a:rPr lang="pt-BR" sz="2400" dirty="0" smtClean="0"/>
-              <a:t>Para realizar a comparação de outros tipos de objetos também utilizamos o método </a:t>
-            </a:r>
-            <a:r>
-              <a:rPr lang="pt-BR" sz="2400" u="sng" dirty="0" err="1" smtClean="0"/>
-              <a:t>compareTo</a:t>
-            </a:r>
-            <a:r>
-              <a:rPr lang="pt-BR" sz="2400" u="sng" dirty="0" smtClean="0"/>
-              <a:t>()</a:t>
-            </a:r>
-          </a:p>
-          <a:p>
-            <a:pPr marL="449263" indent="0">
-              <a:buNone/>
-              <a:tabLst>
-                <a:tab pos="898525" algn="l"/>
-              </a:tabLst>
-            </a:pPr>
-            <a:endParaRPr lang="pt-BR" sz="1800" b="1" dirty="0" smtClean="0"/>
-          </a:p>
-          <a:p>
-            <a:pPr marL="0" lvl="1" indent="0">
-              <a:buNone/>
-              <a:tabLst>
-                <a:tab pos="546100" algn="l"/>
-              </a:tabLst>
-            </a:pPr>
-            <a:endParaRPr lang="pt-BR" sz="2000" dirty="0" smtClean="0"/>
-          </a:p>
-          <a:p>
-            <a:pPr marL="449263" lvl="1" indent="0">
-              <a:spcBef>
-                <a:spcPts val="0"/>
-              </a:spcBef>
-              <a:buNone/>
-              <a:tabLst>
-                <a:tab pos="898525" algn="l"/>
-              </a:tabLst>
-            </a:pPr>
-            <a:r>
-              <a:rPr lang="pt-BR" sz="2000" dirty="0" err="1" smtClean="0">
-                <a:solidFill>
-                  <a:srgbClr val="FFC000"/>
-                </a:solidFill>
-              </a:rPr>
-              <a:t>Funcionario</a:t>
-            </a:r>
-            <a:r>
-              <a:rPr lang="pt-BR" sz="2000" dirty="0" smtClean="0">
-                <a:solidFill>
-                  <a:srgbClr val="FFC000"/>
-                </a:solidFill>
-              </a:rPr>
-              <a:t> f1</a:t>
-            </a:r>
-            <a:r>
-              <a:rPr lang="pt-BR" sz="2000" dirty="0" smtClean="0"/>
-              <a:t> = </a:t>
-            </a:r>
-            <a:r>
-              <a:rPr lang="pt-BR" sz="2000" dirty="0" err="1" smtClean="0"/>
-              <a:t>new</a:t>
-            </a:r>
-            <a:r>
-              <a:rPr lang="pt-BR" sz="2000" dirty="0" smtClean="0"/>
-              <a:t> </a:t>
-            </a:r>
-            <a:r>
-              <a:rPr lang="pt-BR" sz="2000" dirty="0" err="1" smtClean="0"/>
-              <a:t>Funcionario</a:t>
-            </a:r>
-            <a:r>
-              <a:rPr lang="pt-BR" sz="2000" dirty="0" smtClean="0"/>
-              <a:t>(</a:t>
-            </a:r>
-            <a:r>
-              <a:rPr lang="pt-BR" sz="1800" dirty="0" smtClean="0"/>
-              <a:t>1021, "João", "Vendedor", 1815.5</a:t>
-            </a:r>
-            <a:r>
-              <a:rPr lang="pt-BR" sz="2000" dirty="0" smtClean="0"/>
-              <a:t>);</a:t>
-            </a:r>
-          </a:p>
-          <a:p>
-            <a:pPr marL="449263" lvl="1" indent="0">
-              <a:spcBef>
-                <a:spcPts val="0"/>
-              </a:spcBef>
-              <a:buNone/>
-              <a:tabLst>
-                <a:tab pos="898525" algn="l"/>
-              </a:tabLst>
-            </a:pPr>
-            <a:r>
-              <a:rPr lang="pt-BR" sz="2000" dirty="0" err="1" smtClean="0">
-                <a:solidFill>
-                  <a:srgbClr val="FFC000"/>
-                </a:solidFill>
-              </a:rPr>
-              <a:t>Funcionario</a:t>
-            </a:r>
-            <a:r>
-              <a:rPr lang="pt-BR" sz="2000" dirty="0" smtClean="0">
-                <a:solidFill>
-                  <a:srgbClr val="FFC000"/>
-                </a:solidFill>
-              </a:rPr>
-              <a:t> f2</a:t>
-            </a:r>
-            <a:r>
-              <a:rPr lang="pt-BR" sz="2000" dirty="0" smtClean="0"/>
-              <a:t> = </a:t>
-            </a:r>
-            <a:r>
-              <a:rPr lang="pt-BR" sz="2000" dirty="0" err="1" smtClean="0"/>
-              <a:t>new</a:t>
-            </a:r>
-            <a:r>
-              <a:rPr lang="pt-BR" sz="2000" dirty="0" smtClean="0"/>
-              <a:t> </a:t>
-            </a:r>
-            <a:r>
-              <a:rPr lang="pt-BR" sz="2000" dirty="0" err="1" smtClean="0"/>
-              <a:t>Funcionario</a:t>
-            </a:r>
-            <a:r>
-              <a:rPr lang="pt-BR" sz="2000" dirty="0" smtClean="0"/>
-              <a:t>(.......);</a:t>
-            </a:r>
-          </a:p>
-          <a:p>
-            <a:pPr marL="449263" lvl="1" indent="0">
-              <a:spcBef>
-                <a:spcPts val="0"/>
-              </a:spcBef>
-              <a:buNone/>
-              <a:tabLst>
-                <a:tab pos="898525" algn="l"/>
-              </a:tabLst>
-            </a:pPr>
-            <a:endParaRPr lang="pt-BR" sz="2000" dirty="0" smtClean="0"/>
-          </a:p>
-          <a:p>
-            <a:pPr marL="449263" lvl="1" indent="0">
-              <a:spcBef>
-                <a:spcPts val="0"/>
-              </a:spcBef>
-              <a:buNone/>
-              <a:tabLst>
-                <a:tab pos="898525" algn="l"/>
-              </a:tabLst>
-            </a:pPr>
-            <a:r>
-              <a:rPr lang="pt-BR" sz="2000" dirty="0" err="1" smtClean="0"/>
-              <a:t>if</a:t>
-            </a:r>
-            <a:r>
-              <a:rPr lang="pt-BR" sz="2000" dirty="0" smtClean="0"/>
-              <a:t> (</a:t>
-            </a:r>
-            <a:r>
-              <a:rPr lang="pt-BR" sz="2000" dirty="0" smtClean="0">
-                <a:solidFill>
-                  <a:srgbClr val="FFC000"/>
-                </a:solidFill>
-              </a:rPr>
-              <a:t>f1.</a:t>
-            </a:r>
-            <a:r>
-              <a:rPr lang="pt-BR" sz="2000" dirty="0" err="1" smtClean="0">
-                <a:solidFill>
-                  <a:srgbClr val="FFC000"/>
-                </a:solidFill>
-              </a:rPr>
-              <a:t>compareTo</a:t>
-            </a:r>
-            <a:r>
-              <a:rPr lang="pt-BR" sz="2000" dirty="0" smtClean="0">
-                <a:solidFill>
-                  <a:srgbClr val="FFC000"/>
-                </a:solidFill>
-              </a:rPr>
-              <a:t>(f2) &gt; 0</a:t>
-            </a:r>
-            <a:r>
-              <a:rPr lang="pt-BR" sz="2000" dirty="0" smtClean="0"/>
-              <a:t>) {</a:t>
-            </a:r>
-          </a:p>
-          <a:p>
-            <a:pPr marL="449263" lvl="1" indent="0">
-              <a:spcBef>
-                <a:spcPts val="0"/>
-              </a:spcBef>
-              <a:buNone/>
-              <a:tabLst>
-                <a:tab pos="898525" algn="l"/>
-              </a:tabLst>
-            </a:pPr>
-            <a:r>
-              <a:rPr lang="pt-BR" sz="2000" dirty="0" smtClean="0"/>
-              <a:t>	System.</a:t>
-            </a:r>
-            <a:r>
-              <a:rPr lang="pt-BR" sz="2000" dirty="0" err="1" smtClean="0"/>
-              <a:t>out.println</a:t>
-            </a:r>
-            <a:r>
-              <a:rPr lang="pt-BR" sz="2000" dirty="0" smtClean="0"/>
-              <a:t>(“O primeiro </a:t>
-            </a:r>
-            <a:r>
-              <a:rPr lang="pt-BR" sz="2000" dirty="0" err="1" smtClean="0"/>
-              <a:t>funcionario</a:t>
-            </a:r>
-            <a:r>
-              <a:rPr lang="pt-BR" sz="2000" dirty="0" smtClean="0"/>
-              <a:t> é maior");</a:t>
-            </a:r>
-          </a:p>
-          <a:p>
-            <a:pPr marL="449263" lvl="1" indent="0">
-              <a:spcBef>
-                <a:spcPts val="0"/>
-              </a:spcBef>
-              <a:buNone/>
-              <a:tabLst>
-                <a:tab pos="898525" algn="l"/>
-              </a:tabLst>
-            </a:pPr>
-            <a:r>
-              <a:rPr lang="pt-BR" sz="2000" dirty="0" smtClean="0"/>
-              <a:t>} </a:t>
-            </a:r>
-            <a:r>
-              <a:rPr lang="pt-BR" sz="2000" dirty="0" err="1" smtClean="0"/>
-              <a:t>else</a:t>
-            </a:r>
-            <a:r>
-              <a:rPr lang="pt-BR" sz="2000" dirty="0" smtClean="0"/>
-              <a:t> </a:t>
-            </a:r>
-            <a:r>
-              <a:rPr lang="pt-BR" sz="2000" dirty="0" err="1" smtClean="0"/>
-              <a:t>if</a:t>
-            </a:r>
-            <a:r>
-              <a:rPr lang="pt-BR" sz="2000" dirty="0" smtClean="0"/>
-              <a:t> (</a:t>
-            </a:r>
-            <a:r>
-              <a:rPr lang="pt-BR" sz="2000" dirty="0" smtClean="0">
-                <a:solidFill>
-                  <a:srgbClr val="FFC000"/>
-                </a:solidFill>
-              </a:rPr>
-              <a:t>f1.</a:t>
-            </a:r>
-            <a:r>
-              <a:rPr lang="pt-BR" sz="2000" dirty="0" err="1" smtClean="0">
-                <a:solidFill>
-                  <a:srgbClr val="FFC000"/>
-                </a:solidFill>
-              </a:rPr>
-              <a:t>compareTo</a:t>
-            </a:r>
-            <a:r>
-              <a:rPr lang="pt-BR" sz="2000" dirty="0" smtClean="0">
-                <a:solidFill>
-                  <a:srgbClr val="FFC000"/>
-                </a:solidFill>
-              </a:rPr>
-              <a:t>(f2) &lt; 0</a:t>
-            </a:r>
-            <a:r>
-              <a:rPr lang="pt-BR" sz="2000" dirty="0" smtClean="0"/>
-              <a:t>) {</a:t>
-            </a:r>
-          </a:p>
-          <a:p>
-            <a:pPr marL="449263" lvl="1" indent="0">
-              <a:spcBef>
-                <a:spcPts val="0"/>
-              </a:spcBef>
-              <a:buNone/>
-              <a:tabLst>
-                <a:tab pos="898525" algn="l"/>
-              </a:tabLst>
-            </a:pPr>
-            <a:r>
-              <a:rPr lang="pt-BR" sz="2000" dirty="0" smtClean="0"/>
-              <a:t>	System.</a:t>
-            </a:r>
-            <a:r>
-              <a:rPr lang="pt-BR" sz="2000" dirty="0" err="1" smtClean="0"/>
-              <a:t>out.println</a:t>
-            </a:r>
-            <a:r>
-              <a:rPr lang="pt-BR" sz="2000" dirty="0" smtClean="0"/>
-              <a:t>(“O segundo </a:t>
-            </a:r>
-            <a:r>
-              <a:rPr lang="pt-BR" sz="2000" dirty="0" err="1" smtClean="0"/>
-              <a:t>funcionario</a:t>
-            </a:r>
-            <a:r>
-              <a:rPr lang="pt-BR" sz="2000" dirty="0" smtClean="0"/>
-              <a:t> é maior");</a:t>
-            </a:r>
-          </a:p>
-          <a:p>
-            <a:pPr marL="449263" lvl="1" indent="0">
-              <a:spcBef>
-                <a:spcPts val="0"/>
-              </a:spcBef>
-              <a:buNone/>
-              <a:tabLst>
-                <a:tab pos="898525" algn="l"/>
-              </a:tabLst>
-            </a:pPr>
-            <a:r>
-              <a:rPr lang="pt-BR" sz="2000" dirty="0" smtClean="0"/>
-              <a:t>} </a:t>
-            </a:r>
-            <a:r>
-              <a:rPr lang="pt-BR" sz="2000" dirty="0" err="1" smtClean="0"/>
-              <a:t>else</a:t>
-            </a:r>
-            <a:r>
-              <a:rPr lang="pt-BR" sz="2000" dirty="0" smtClean="0"/>
-              <a:t> {</a:t>
-            </a:r>
-          </a:p>
-          <a:p>
-            <a:pPr marL="449263" lvl="1" indent="0">
-              <a:spcBef>
-                <a:spcPts val="0"/>
-              </a:spcBef>
-              <a:buNone/>
-              <a:tabLst>
-                <a:tab pos="898525" algn="l"/>
-              </a:tabLst>
-            </a:pPr>
-            <a:r>
-              <a:rPr lang="pt-BR" sz="2000" dirty="0" smtClean="0"/>
-              <a:t>	System.</a:t>
-            </a:r>
-            <a:r>
-              <a:rPr lang="pt-BR" sz="2000" dirty="0" err="1" smtClean="0"/>
-              <a:t>out.println</a:t>
-            </a:r>
-            <a:r>
-              <a:rPr lang="pt-BR" sz="2000" dirty="0" smtClean="0"/>
-              <a:t>("</a:t>
-            </a:r>
-            <a:r>
-              <a:rPr lang="pt-BR" sz="2000" dirty="0" err="1" smtClean="0"/>
-              <a:t>Funcionarios</a:t>
-            </a:r>
-            <a:r>
-              <a:rPr lang="pt-BR" sz="2000" dirty="0" smtClean="0"/>
-              <a:t> iguais");</a:t>
-            </a:r>
-          </a:p>
-          <a:p>
-            <a:pPr marL="449263" lvl="1" indent="0">
-              <a:spcBef>
-                <a:spcPts val="0"/>
-              </a:spcBef>
-              <a:buNone/>
-              <a:tabLst>
-                <a:tab pos="898525" algn="l"/>
-              </a:tabLst>
-            </a:pPr>
-            <a:r>
-              <a:rPr lang="pt-BR" sz="2000" dirty="0" smtClean="0"/>
-              <a:t>}</a:t>
-            </a:r>
-          </a:p>
-        </p:txBody>
-      </p:sp>
-      <p:sp>
-        <p:nvSpPr>
-          <p:cNvPr id="4" name="Espaço Reservado para Número de Slide 3"/>
-          <p:cNvSpPr>
-            <a:spLocks noGrp="1"/>
-          </p:cNvSpPr>
-          <p:nvPr>
-            <p:ph type="sldNum" sz="quarter" idx="12"/>
-          </p:nvPr>
-        </p:nvSpPr>
-        <p:spPr/>
-        <p:txBody>
-          <a:bodyPr/>
-          <a:lstStyle/>
-          <a:p>
-            <a:pPr>
-              <a:defRPr/>
-            </a:pPr>
-            <a:fld id="{6AC7DC48-89D4-446D-B83C-6D0DD696F928}" type="slidenum">
-              <a:rPr lang="pt-BR" smtClean="0"/>
-              <a:pPr>
-                <a:defRPr/>
-              </a:pPr>
-              <a:t>20</a:t>
-            </a:fld>
-            <a:endParaRPr lang="pt-BR"/>
-          </a:p>
-        </p:txBody>
-      </p:sp>
-    </p:spTree>
-  </p:cSld>
-  <p:clrMapOvr>
-    <a:masterClrMapping/>
-  </p:clrMapOvr>
-  <p:timing>
-    <p:tnLst>
-      <p:par>
-        <p:cTn id="1" dur="indefinite" restart="never" nodeType="tmRoot"/>
-      </p:par>
-    </p:tnLst>
-  </p:timing>
-</p:sld>
-</file>
-
-<file path=ppt/slides/slide21.xml><?xml version="1.0" encoding="utf-8"?>
-<p:sld xmlns:a="http://schemas.openxmlformats.org/drawingml/2006/main" xmlns:r="http://schemas.openxmlformats.org/officeDocument/2006/relationships" xmlns:p="http://schemas.openxmlformats.org/presentationml/2006/main">
-  <p:cSld>
-    <p:spTree>
-      <p:nvGrpSpPr>
-        <p:cNvPr id="1" name=""/>
-        <p:cNvGrpSpPr/>
-        <p:nvPr/>
-      </p:nvGrpSpPr>
-      <p:grpSpPr>
-        <a:xfrm>
-          <a:off x="0" y="0"/>
-          <a:ext cx="0" cy="0"/>
-          <a:chOff x="0" y="0"/>
-          <a:chExt cx="0" cy="0"/>
-        </a:xfrm>
-      </p:grpSpPr>
-      <p:sp>
-        <p:nvSpPr>
-          <p:cNvPr id="2" name="Título 1"/>
-          <p:cNvSpPr>
-            <a:spLocks noGrp="1"/>
-          </p:cNvSpPr>
-          <p:nvPr>
-            <p:ph type="title"/>
-          </p:nvPr>
-        </p:nvSpPr>
-        <p:spPr>
-          <a:xfrm>
-            <a:off x="457200" y="274638"/>
-            <a:ext cx="8472518" cy="1143000"/>
-          </a:xfrm>
-          <a:noFill/>
-          <a:ln w="9525">
-            <a:noFill/>
-            <a:miter lim="800000"/>
-            <a:headEnd/>
-            <a:tailEnd/>
-          </a:ln>
-        </p:spPr>
-        <p:txBody>
-          <a:bodyPr vert="horz" wrap="square" lIns="45720" tIns="45720" rIns="45720" bIns="45720" numCol="1" anchor="ctr" anchorCtr="0" compatLnSpc="1">
-            <a:prstTxWarp prst="textNoShape">
-              <a:avLst/>
-            </a:prstTxWarp>
-          </a:bodyPr>
-          <a:lstStyle/>
-          <a:p>
-            <a:pPr eaLnBrk="1" hangingPunct="1"/>
-            <a:r>
-              <a:rPr lang="pt-BR" sz="3600" dirty="0" smtClean="0"/>
-              <a:t>Implementando a interface </a:t>
-            </a:r>
-            <a:r>
-              <a:rPr lang="pt-BR" sz="3600" dirty="0" err="1" smtClean="0"/>
-              <a:t>Comparable</a:t>
-            </a:r>
-            <a:endParaRPr lang="pt-BR" sz="3600" dirty="0"/>
-          </a:p>
-        </p:txBody>
-      </p:sp>
-      <p:sp>
-        <p:nvSpPr>
-          <p:cNvPr id="3" name="Espaço Reservado para Conteúdo 2"/>
-          <p:cNvSpPr>
-            <a:spLocks noGrp="1"/>
-          </p:cNvSpPr>
-          <p:nvPr>
-            <p:ph idx="1"/>
-          </p:nvPr>
-        </p:nvSpPr>
-        <p:spPr/>
-        <p:txBody>
-          <a:bodyPr/>
-          <a:lstStyle/>
-          <a:p>
-            <a:pPr>
-              <a:spcBef>
-                <a:spcPts val="3000"/>
-              </a:spcBef>
-            </a:pPr>
-            <a:r>
-              <a:rPr lang="pt-BR" dirty="0" smtClean="0"/>
-              <a:t>O método </a:t>
-            </a:r>
-            <a:r>
-              <a:rPr lang="pt-BR" b="1" i="1" dirty="0" err="1" smtClean="0"/>
-              <a:t>compareTo</a:t>
-            </a:r>
-            <a:r>
-              <a:rPr lang="pt-BR" b="1" i="1" dirty="0" smtClean="0"/>
-              <a:t>()</a:t>
-            </a:r>
-            <a:r>
-              <a:rPr lang="pt-BR" dirty="0" smtClean="0"/>
-              <a:t> só funciona em classes que implementam a interface </a:t>
-            </a:r>
-            <a:r>
-              <a:rPr lang="pt-BR" b="1" i="1" dirty="0" err="1" smtClean="0"/>
-              <a:t>java</a:t>
-            </a:r>
-            <a:r>
-              <a:rPr lang="pt-BR" b="1" i="1" dirty="0" smtClean="0"/>
-              <a:t>.</a:t>
-            </a:r>
-            <a:r>
-              <a:rPr lang="pt-BR" b="1" i="1" dirty="0" err="1" smtClean="0"/>
-              <a:t>lang</a:t>
-            </a:r>
-            <a:r>
-              <a:rPr lang="pt-BR" b="1" i="1" dirty="0" smtClean="0"/>
-              <a:t>.</a:t>
-            </a:r>
-            <a:r>
-              <a:rPr lang="pt-BR" b="1" i="1" dirty="0" err="1" smtClean="0"/>
-              <a:t>Comparable</a:t>
-            </a:r>
-            <a:endParaRPr lang="pt-BR" dirty="0" smtClean="0"/>
-          </a:p>
-          <a:p>
-            <a:pPr>
-              <a:spcBef>
-                <a:spcPts val="3000"/>
-              </a:spcBef>
-            </a:pPr>
-            <a:endParaRPr lang="pt-BR" b="1" i="1" dirty="0"/>
-          </a:p>
-        </p:txBody>
-      </p:sp>
-      <p:sp>
-        <p:nvSpPr>
-          <p:cNvPr id="4" name="Espaço Reservado para Número de Slide 3"/>
-          <p:cNvSpPr>
-            <a:spLocks noGrp="1"/>
-          </p:cNvSpPr>
-          <p:nvPr>
-            <p:ph type="sldNum" sz="quarter" idx="12"/>
-          </p:nvPr>
-        </p:nvSpPr>
-        <p:spPr/>
-        <p:txBody>
-          <a:bodyPr/>
-          <a:lstStyle/>
-          <a:p>
-            <a:pPr>
-              <a:defRPr/>
-            </a:pPr>
-            <a:fld id="{6AC7DC48-89D4-446D-B83C-6D0DD696F928}" type="slidenum">
-              <a:rPr lang="pt-BR" smtClean="0"/>
-              <a:pPr>
-                <a:defRPr/>
-              </a:pPr>
-              <a:t>21</a:t>
-            </a:fld>
-            <a:endParaRPr lang="pt-BR"/>
-          </a:p>
-        </p:txBody>
-      </p:sp>
-    </p:spTree>
-  </p:cSld>
-  <p:clrMapOvr>
-    <a:masterClrMapping/>
-  </p:clrMapOvr>
-  <p:timing>
-    <p:tnLst>
-      <p:par>
-        <p:cTn id="1" dur="indefinite" restart="never" nodeType="tmRoot"/>
-      </p:par>
-    </p:tnLst>
-  </p:timing>
-</p:sld>
-</file>
-
-<file path=ppt/slides/slide22.xml><?xml version="1.0" encoding="utf-8"?>
-<p:sld xmlns:a="http://schemas.openxmlformats.org/drawingml/2006/main" xmlns:r="http://schemas.openxmlformats.org/officeDocument/2006/relationships" xmlns:p="http://schemas.openxmlformats.org/presentationml/2006/main">
-  <p:cSld>
-    <p:spTree>
-      <p:nvGrpSpPr>
-        <p:cNvPr id="1" name=""/>
-        <p:cNvGrpSpPr/>
-        <p:nvPr/>
-      </p:nvGrpSpPr>
-      <p:grpSpPr>
-        <a:xfrm>
-          <a:off x="0" y="0"/>
-          <a:ext cx="0" cy="0"/>
-          <a:chOff x="0" y="0"/>
-          <a:chExt cx="0" cy="0"/>
-        </a:xfrm>
-      </p:grpSpPr>
-      <p:sp>
-        <p:nvSpPr>
-          <p:cNvPr id="12290" name="Título 1"/>
-          <p:cNvSpPr>
-            <a:spLocks noGrp="1"/>
-          </p:cNvSpPr>
-          <p:nvPr>
-            <p:ph type="title"/>
-          </p:nvPr>
-        </p:nvSpPr>
-        <p:spPr>
-          <a:xfrm>
-            <a:off x="457200" y="274638"/>
-            <a:ext cx="8435280" cy="1143000"/>
-          </a:xfrm>
-        </p:spPr>
-        <p:txBody>
-          <a:bodyPr/>
-          <a:lstStyle/>
-          <a:p>
-            <a:pPr eaLnBrk="1" hangingPunct="1"/>
-            <a:r>
-              <a:rPr lang="pt-BR" sz="3600" dirty="0" smtClean="0"/>
-              <a:t>Implementando a interface Comparable</a:t>
-            </a:r>
-          </a:p>
-        </p:txBody>
-      </p:sp>
-      <p:sp>
-        <p:nvSpPr>
-          <p:cNvPr id="12291" name="Espaço Reservado para Conteúdo 2"/>
-          <p:cNvSpPr>
-            <a:spLocks noGrp="1"/>
-          </p:cNvSpPr>
-          <p:nvPr>
-            <p:ph idx="1"/>
-          </p:nvPr>
-        </p:nvSpPr>
-        <p:spPr>
-          <a:xfrm>
-            <a:off x="497632" y="1556793"/>
-            <a:ext cx="7962800" cy="4824536"/>
-          </a:xfrm>
-        </p:spPr>
-        <p:txBody>
-          <a:bodyPr/>
-          <a:lstStyle/>
-          <a:p>
-            <a:pPr marL="0" indent="0">
-              <a:spcBef>
-                <a:spcPts val="0"/>
-              </a:spcBef>
-              <a:buNone/>
-              <a:tabLst>
-                <a:tab pos="530225" algn="l"/>
-                <a:tab pos="1076325" algn="l"/>
-              </a:tabLst>
-            </a:pPr>
-            <a:r>
-              <a:rPr lang="pt-BR" sz="1800" dirty="0" smtClean="0"/>
-              <a:t>public class Funcionario </a:t>
-            </a:r>
-            <a:r>
-              <a:rPr lang="pt-BR" sz="1800" dirty="0" smtClean="0">
-                <a:solidFill>
-                  <a:srgbClr val="FFC000"/>
-                </a:solidFill>
-              </a:rPr>
-              <a:t>implements Comparable&lt;Funcionario&gt;</a:t>
-            </a:r>
-            <a:r>
-              <a:rPr lang="pt-BR" sz="1800" dirty="0" smtClean="0"/>
-              <a:t> {</a:t>
-            </a:r>
-          </a:p>
-          <a:p>
-            <a:pPr marL="0" indent="0">
-              <a:spcBef>
-                <a:spcPts val="0"/>
-              </a:spcBef>
-              <a:buNone/>
-              <a:tabLst>
-                <a:tab pos="530225" algn="l"/>
-                <a:tab pos="1076325" algn="l"/>
-              </a:tabLst>
-            </a:pPr>
-            <a:endParaRPr lang="pt-BR" sz="1800" dirty="0" smtClean="0"/>
-          </a:p>
-          <a:p>
-            <a:pPr marL="0" indent="0">
-              <a:spcBef>
-                <a:spcPts val="0"/>
-              </a:spcBef>
-              <a:buNone/>
-              <a:tabLst>
-                <a:tab pos="530225" algn="l"/>
-                <a:tab pos="1076325" algn="l"/>
-              </a:tabLst>
-            </a:pPr>
-            <a:r>
-              <a:rPr lang="pt-BR" sz="1800" dirty="0" smtClean="0"/>
-              <a:t>	</a:t>
-            </a:r>
-            <a:r>
-              <a:rPr lang="pt-BR" sz="1800" dirty="0" err="1" smtClean="0"/>
-              <a:t>private</a:t>
-            </a:r>
-            <a:r>
-              <a:rPr lang="pt-BR" sz="1800" dirty="0" smtClean="0"/>
-              <a:t> </a:t>
-            </a:r>
-            <a:r>
-              <a:rPr lang="pt-BR" sz="1800" dirty="0" err="1" smtClean="0"/>
-              <a:t>int</a:t>
-            </a:r>
-            <a:r>
-              <a:rPr lang="pt-BR" sz="1800" dirty="0" smtClean="0"/>
-              <a:t> matricula;</a:t>
-            </a:r>
-          </a:p>
-          <a:p>
-            <a:pPr marL="0" indent="0">
-              <a:spcBef>
-                <a:spcPts val="0"/>
-              </a:spcBef>
-              <a:buNone/>
-              <a:tabLst>
-                <a:tab pos="530225" algn="l"/>
-                <a:tab pos="1076325" algn="l"/>
-              </a:tabLst>
-            </a:pPr>
-            <a:r>
-              <a:rPr lang="pt-BR" sz="1800" dirty="0" smtClean="0"/>
-              <a:t>	</a:t>
-            </a:r>
-            <a:r>
-              <a:rPr lang="pt-BR" sz="1800" dirty="0" err="1" smtClean="0"/>
-              <a:t>private</a:t>
-            </a:r>
-            <a:r>
-              <a:rPr lang="pt-BR" sz="1800" dirty="0" smtClean="0"/>
-              <a:t> String </a:t>
-            </a:r>
-            <a:r>
-              <a:rPr lang="pt-BR" sz="1800" u="sng" dirty="0" smtClean="0"/>
-              <a:t>nome</a:t>
-            </a:r>
-            <a:r>
-              <a:rPr lang="pt-BR" sz="1800" dirty="0" smtClean="0"/>
-              <a:t>;</a:t>
-            </a:r>
-          </a:p>
-          <a:p>
-            <a:pPr marL="0" indent="0">
-              <a:spcBef>
-                <a:spcPts val="0"/>
-              </a:spcBef>
-              <a:buNone/>
-              <a:tabLst>
-                <a:tab pos="530225" algn="l"/>
-                <a:tab pos="1076325" algn="l"/>
-              </a:tabLst>
-            </a:pPr>
-            <a:r>
-              <a:rPr lang="pt-BR" sz="1800" dirty="0" smtClean="0"/>
-              <a:t>	</a:t>
-            </a:r>
-            <a:r>
-              <a:rPr lang="pt-BR" sz="1800" dirty="0" err="1" smtClean="0"/>
-              <a:t>private</a:t>
-            </a:r>
-            <a:r>
-              <a:rPr lang="pt-BR" sz="1800" dirty="0" smtClean="0"/>
-              <a:t> String cargo;</a:t>
-            </a:r>
-          </a:p>
-          <a:p>
-            <a:pPr marL="0" indent="0">
-              <a:spcBef>
-                <a:spcPts val="0"/>
-              </a:spcBef>
-              <a:buNone/>
-              <a:tabLst>
-                <a:tab pos="530225" algn="l"/>
-                <a:tab pos="1076325" algn="l"/>
-              </a:tabLst>
-            </a:pPr>
-            <a:endParaRPr lang="pt-BR" sz="1800" dirty="0" smtClean="0"/>
-          </a:p>
-          <a:p>
-            <a:pPr marL="0" indent="0">
-              <a:spcBef>
-                <a:spcPts val="0"/>
-              </a:spcBef>
-              <a:buNone/>
-              <a:tabLst>
-                <a:tab pos="530225" algn="l"/>
-                <a:tab pos="1076325" algn="l"/>
-              </a:tabLst>
-            </a:pPr>
-            <a:r>
-              <a:rPr lang="pt-BR" sz="1800" dirty="0" smtClean="0"/>
-              <a:t>	// ... métodos </a:t>
-            </a:r>
-            <a:r>
-              <a:rPr lang="pt-BR" sz="1800" dirty="0" err="1" smtClean="0"/>
-              <a:t>gets</a:t>
-            </a:r>
-            <a:r>
-              <a:rPr lang="pt-BR" sz="1800" dirty="0" smtClean="0"/>
-              <a:t> e sets</a:t>
-            </a:r>
-          </a:p>
-          <a:p>
-            <a:pPr marL="0" indent="0">
-              <a:spcBef>
-                <a:spcPts val="0"/>
-              </a:spcBef>
-              <a:buNone/>
-              <a:tabLst>
-                <a:tab pos="530225" algn="l"/>
-                <a:tab pos="1076325" algn="l"/>
-              </a:tabLst>
-            </a:pPr>
-            <a:endParaRPr lang="pt-BR" sz="1800" dirty="0" smtClean="0"/>
-          </a:p>
-          <a:p>
-            <a:pPr marL="0" indent="0">
-              <a:spcBef>
-                <a:spcPts val="0"/>
-              </a:spcBef>
-              <a:buNone/>
-              <a:tabLst>
-                <a:tab pos="530225" algn="l"/>
-                <a:tab pos="1076325" algn="l"/>
-              </a:tabLst>
-            </a:pPr>
-            <a:r>
-              <a:rPr lang="pt-BR" sz="1800" dirty="0" smtClean="0"/>
-              <a:t>	</a:t>
-            </a:r>
-            <a:r>
-              <a:rPr lang="pt-BR" sz="1800" dirty="0" smtClean="0">
-                <a:solidFill>
-                  <a:srgbClr val="FFC000"/>
-                </a:solidFill>
-              </a:rPr>
-              <a:t>public int compareTo(Funcionario outro)</a:t>
-            </a:r>
-            <a:r>
-              <a:rPr lang="pt-BR" sz="1800" dirty="0" smtClean="0"/>
-              <a:t> {</a:t>
-            </a:r>
-          </a:p>
-          <a:p>
-            <a:pPr marL="0" indent="0">
-              <a:spcBef>
-                <a:spcPts val="0"/>
-              </a:spcBef>
-              <a:buNone/>
-              <a:tabLst>
-                <a:tab pos="530225" algn="l"/>
-                <a:tab pos="1076325" algn="l"/>
-              </a:tabLst>
-            </a:pPr>
-            <a:r>
-              <a:rPr lang="pt-BR" sz="1800" dirty="0" smtClean="0"/>
-              <a:t>		if (</a:t>
-            </a:r>
-            <a:r>
-              <a:rPr lang="pt-BR" sz="1800" u="sng" dirty="0" smtClean="0"/>
-              <a:t>this.nome</a:t>
-            </a:r>
-            <a:r>
-              <a:rPr lang="pt-BR" sz="1800" dirty="0" smtClean="0"/>
-              <a:t>.compareTo(</a:t>
-            </a:r>
-            <a:r>
-              <a:rPr lang="pt-BR" sz="1800" u="sng" dirty="0" smtClean="0"/>
-              <a:t>outro.nome</a:t>
-            </a:r>
-            <a:r>
-              <a:rPr lang="pt-BR" sz="1800" dirty="0" smtClean="0"/>
-              <a:t>) &gt; 0) {</a:t>
-            </a:r>
-          </a:p>
-          <a:p>
-            <a:pPr marL="0" indent="0">
-              <a:spcBef>
-                <a:spcPts val="0"/>
-              </a:spcBef>
-              <a:buNone/>
-              <a:tabLst>
-                <a:tab pos="530225" algn="l"/>
-                <a:tab pos="1076325" algn="l"/>
-              </a:tabLst>
-            </a:pPr>
-            <a:r>
-              <a:rPr lang="pt-BR" sz="1800" dirty="0" smtClean="0"/>
-              <a:t>			return 1;</a:t>
-            </a:r>
-          </a:p>
-          <a:p>
-            <a:pPr marL="0" indent="0">
-              <a:spcBef>
-                <a:spcPts val="0"/>
-              </a:spcBef>
-              <a:buNone/>
-              <a:tabLst>
-                <a:tab pos="530225" algn="l"/>
-                <a:tab pos="1076325" algn="l"/>
-              </a:tabLst>
-            </a:pPr>
-            <a:r>
-              <a:rPr lang="pt-BR" sz="1800" dirty="0" smtClean="0"/>
-              <a:t>		} else (</a:t>
-            </a:r>
-            <a:r>
-              <a:rPr lang="pt-BR" sz="1800" u="sng" dirty="0" smtClean="0"/>
-              <a:t>this.nome</a:t>
-            </a:r>
-            <a:r>
-              <a:rPr lang="pt-BR" sz="1800" dirty="0" smtClean="0"/>
-              <a:t>.compareTo(</a:t>
-            </a:r>
-            <a:r>
-              <a:rPr lang="pt-BR" sz="1800" u="sng" dirty="0" smtClean="0"/>
-              <a:t>outro.nome</a:t>
-            </a:r>
-            <a:r>
-              <a:rPr lang="pt-BR" sz="1800" dirty="0" smtClean="0"/>
-              <a:t>) &lt; 0) {</a:t>
-            </a:r>
-          </a:p>
-          <a:p>
-            <a:pPr marL="0" indent="0">
-              <a:spcBef>
-                <a:spcPts val="0"/>
-              </a:spcBef>
-              <a:buNone/>
-              <a:tabLst>
-                <a:tab pos="530225" algn="l"/>
-                <a:tab pos="1076325" algn="l"/>
-              </a:tabLst>
-            </a:pPr>
-            <a:r>
-              <a:rPr lang="pt-BR" sz="1800" dirty="0" smtClean="0"/>
-              <a:t>			return -1;</a:t>
-            </a:r>
-          </a:p>
-          <a:p>
-            <a:pPr marL="0" indent="0">
-              <a:spcBef>
-                <a:spcPts val="0"/>
-              </a:spcBef>
-              <a:buNone/>
-              <a:tabLst>
-                <a:tab pos="530225" algn="l"/>
-                <a:tab pos="1076325" algn="l"/>
-              </a:tabLst>
-            </a:pPr>
-            <a:r>
-              <a:rPr lang="pt-BR" sz="1800" dirty="0" smtClean="0"/>
-              <a:t>		} else {</a:t>
-            </a:r>
-          </a:p>
-          <a:p>
-            <a:pPr marL="0" indent="0">
-              <a:spcBef>
-                <a:spcPts val="0"/>
-              </a:spcBef>
-              <a:buNone/>
-              <a:tabLst>
-                <a:tab pos="530225" algn="l"/>
-                <a:tab pos="1076325" algn="l"/>
-              </a:tabLst>
-            </a:pPr>
-            <a:r>
-              <a:rPr lang="pt-BR" sz="1800" dirty="0" smtClean="0"/>
-              <a:t>			return 0;</a:t>
-            </a:r>
-          </a:p>
-          <a:p>
-            <a:pPr marL="0" indent="0">
-              <a:spcBef>
-                <a:spcPts val="0"/>
-              </a:spcBef>
-              <a:buNone/>
-              <a:tabLst>
-                <a:tab pos="530225" algn="l"/>
-                <a:tab pos="1076325" algn="l"/>
-              </a:tabLst>
-            </a:pPr>
-            <a:r>
-              <a:rPr lang="pt-BR" sz="1800" dirty="0" smtClean="0"/>
-              <a:t>		}</a:t>
-            </a:r>
-          </a:p>
-          <a:p>
-            <a:pPr marL="0" indent="0">
-              <a:spcBef>
-                <a:spcPts val="0"/>
-              </a:spcBef>
-              <a:buNone/>
-              <a:tabLst>
-                <a:tab pos="530225" algn="l"/>
-                <a:tab pos="1076325" algn="l"/>
-              </a:tabLst>
-            </a:pPr>
-            <a:r>
-              <a:rPr lang="pt-BR" sz="1800" dirty="0" smtClean="0"/>
-              <a:t>	}</a:t>
-            </a:r>
-          </a:p>
-          <a:p>
-            <a:pPr marL="0" indent="0">
-              <a:spcBef>
-                <a:spcPts val="0"/>
-              </a:spcBef>
-              <a:buNone/>
-              <a:tabLst>
-                <a:tab pos="530225" algn="l"/>
-                <a:tab pos="1076325" algn="l"/>
-              </a:tabLst>
-            </a:pPr>
-            <a:r>
-              <a:rPr lang="pt-BR" sz="1800" dirty="0" smtClean="0"/>
-              <a:t>}</a:t>
-            </a:r>
-          </a:p>
-        </p:txBody>
-      </p:sp>
-      <p:sp>
-        <p:nvSpPr>
-          <p:cNvPr id="4" name="Espaço Reservado para Número de Slide 3"/>
-          <p:cNvSpPr>
-            <a:spLocks noGrp="1"/>
-          </p:cNvSpPr>
-          <p:nvPr>
-            <p:ph type="sldNum" sz="quarter" idx="12"/>
-          </p:nvPr>
-        </p:nvSpPr>
-        <p:spPr/>
-        <p:txBody>
-          <a:bodyPr/>
-          <a:lstStyle/>
-          <a:p>
-            <a:pPr>
-              <a:defRPr/>
-            </a:pPr>
-            <a:fld id="{6AC7DC48-89D4-446D-B83C-6D0DD696F928}" type="slidenum">
-              <a:rPr lang="pt-BR" smtClean="0"/>
-              <a:pPr>
-                <a:defRPr/>
-              </a:pPr>
-              <a:t>22</a:t>
-            </a:fld>
-            <a:endParaRPr lang="pt-BR"/>
-          </a:p>
-        </p:txBody>
-      </p:sp>
-    </p:spTree>
-  </p:cSld>
-  <p:clrMapOvr>
-    <a:masterClrMapping/>
-  </p:clrMapOvr>
-  <p:timing>
-    <p:tnLst>
-      <p:par>
-        <p:cTn id="1" dur="indefinite" restart="never" nodeType="tmRoot"/>
-      </p:par>
-    </p:tnLst>
-  </p:timing>
-</p:sld>
-</file>
-
-<file path=ppt/slides/slide23.xml><?xml version="1.0" encoding="utf-8"?>
-<p:sld xmlns:a="http://schemas.openxmlformats.org/drawingml/2006/main" xmlns:r="http://schemas.openxmlformats.org/officeDocument/2006/relationships" xmlns:p="http://schemas.openxmlformats.org/presentationml/2006/main">
-  <p:cSld>
-    <p:spTree>
-      <p:nvGrpSpPr>
-        <p:cNvPr id="1" name=""/>
-        <p:cNvGrpSpPr/>
-        <p:nvPr/>
-      </p:nvGrpSpPr>
-      <p:grpSpPr>
-        <a:xfrm>
-          <a:off x="0" y="0"/>
-          <a:ext cx="0" cy="0"/>
-          <a:chOff x="0" y="0"/>
-          <a:chExt cx="0" cy="0"/>
-        </a:xfrm>
-      </p:grpSpPr>
-      <p:sp>
-        <p:nvSpPr>
-          <p:cNvPr id="2" name="Title 1"/>
-          <p:cNvSpPr>
-            <a:spLocks noGrp="1"/>
-          </p:cNvSpPr>
-          <p:nvPr>
-            <p:ph type="title"/>
-          </p:nvPr>
-        </p:nvSpPr>
-        <p:spPr/>
-        <p:txBody>
-          <a:bodyPr/>
-          <a:lstStyle/>
-          <a:p>
-            <a:r>
-              <a:rPr lang="pt-BR" dirty="0" smtClean="0"/>
-              <a:t>Exercício</a:t>
-            </a:r>
-            <a:endParaRPr lang="pt-BR" dirty="0"/>
-          </a:p>
-        </p:txBody>
-      </p:sp>
-      <p:sp>
-        <p:nvSpPr>
-          <p:cNvPr id="3" name="Content Placeholder 2"/>
-          <p:cNvSpPr>
-            <a:spLocks noGrp="1"/>
-          </p:cNvSpPr>
-          <p:nvPr>
-            <p:ph idx="1"/>
-          </p:nvPr>
-        </p:nvSpPr>
-        <p:spPr/>
-        <p:txBody>
-          <a:bodyPr/>
-          <a:lstStyle/>
-          <a:p>
-            <a:pPr>
-              <a:spcBef>
-                <a:spcPts val="2400"/>
-              </a:spcBef>
-            </a:pPr>
-            <a:r>
-              <a:rPr lang="pt-BR" sz="2400" dirty="0" smtClean="0"/>
-              <a:t>Crie uma classe denominada </a:t>
-            </a:r>
-            <a:r>
-              <a:rPr lang="pt-BR" sz="2400" dirty="0" smtClean="0">
-                <a:solidFill>
-                  <a:srgbClr val="FFC000"/>
-                </a:solidFill>
-              </a:rPr>
-              <a:t>Produto</a:t>
-            </a:r>
-            <a:r>
-              <a:rPr lang="pt-BR" sz="2400" dirty="0" smtClean="0"/>
-              <a:t> contendo os seguintes atributos:</a:t>
-            </a:r>
-          </a:p>
-          <a:p>
-            <a:pPr lvl="1">
-              <a:spcBef>
-                <a:spcPts val="0"/>
-              </a:spcBef>
-            </a:pPr>
-            <a:endParaRPr lang="pt-BR" sz="2000" dirty="0" smtClean="0"/>
-          </a:p>
-          <a:p>
-            <a:pPr lvl="1">
-              <a:spcBef>
-                <a:spcPts val="0"/>
-              </a:spcBef>
-            </a:pPr>
-            <a:r>
-              <a:rPr lang="pt-BR" sz="2000" dirty="0" smtClean="0">
-                <a:solidFill>
-                  <a:srgbClr val="FFC000"/>
-                </a:solidFill>
-              </a:rPr>
-              <a:t>codigo</a:t>
-            </a:r>
-            <a:r>
-              <a:rPr lang="pt-BR" sz="2000" dirty="0" smtClean="0"/>
-              <a:t>: inteiro</a:t>
-            </a:r>
-          </a:p>
-          <a:p>
-            <a:pPr lvl="1">
-              <a:spcBef>
-                <a:spcPts val="0"/>
-              </a:spcBef>
-            </a:pPr>
-            <a:r>
-              <a:rPr lang="pt-BR" sz="2000" dirty="0" smtClean="0">
-                <a:solidFill>
-                  <a:srgbClr val="FFC000"/>
-                </a:solidFill>
-              </a:rPr>
-              <a:t>descricao</a:t>
-            </a:r>
-            <a:r>
-              <a:rPr lang="pt-BR" sz="2000" dirty="0" smtClean="0"/>
-              <a:t>: String</a:t>
-            </a:r>
-          </a:p>
-          <a:p>
-            <a:pPr lvl="1">
-              <a:spcBef>
-                <a:spcPts val="0"/>
-              </a:spcBef>
-            </a:pPr>
-            <a:r>
-              <a:rPr lang="pt-BR" sz="2000" dirty="0" smtClean="0">
-                <a:solidFill>
-                  <a:srgbClr val="FFC000"/>
-                </a:solidFill>
-              </a:rPr>
-              <a:t>preco</a:t>
-            </a:r>
-            <a:r>
-              <a:rPr lang="pt-BR" sz="2000" dirty="0" smtClean="0"/>
-              <a:t>: double</a:t>
-            </a:r>
-          </a:p>
-          <a:p>
-            <a:pPr>
-              <a:spcBef>
-                <a:spcPts val="2400"/>
-              </a:spcBef>
-            </a:pPr>
-            <a:r>
-              <a:rPr lang="pt-BR" sz="2400" dirty="0" smtClean="0"/>
-              <a:t>Implemente os métodos </a:t>
-            </a:r>
-            <a:r>
-              <a:rPr lang="pt-BR" sz="2400" dirty="0" smtClean="0">
-                <a:solidFill>
-                  <a:srgbClr val="FFC000"/>
-                </a:solidFill>
-              </a:rPr>
-              <a:t>get</a:t>
-            </a:r>
-            <a:r>
-              <a:rPr lang="pt-BR" sz="2400" dirty="0" smtClean="0"/>
-              <a:t> e </a:t>
-            </a:r>
-            <a:r>
-              <a:rPr lang="pt-BR" sz="2400" dirty="0" smtClean="0">
-                <a:solidFill>
-                  <a:srgbClr val="FFC000"/>
-                </a:solidFill>
-              </a:rPr>
-              <a:t>set</a:t>
-            </a:r>
-            <a:r>
-              <a:rPr lang="pt-BR" sz="2400" dirty="0" smtClean="0"/>
-              <a:t> para cada um destes atributos</a:t>
-            </a:r>
-          </a:p>
-          <a:p>
-            <a:pPr>
-              <a:spcBef>
-                <a:spcPts val="2400"/>
-              </a:spcBef>
-            </a:pPr>
-            <a:r>
-              <a:rPr lang="pt-BR" sz="2400" dirty="0" smtClean="0"/>
-              <a:t>Implemente o método </a:t>
-            </a:r>
-            <a:r>
-              <a:rPr lang="pt-BR" sz="2400" dirty="0" smtClean="0">
-                <a:solidFill>
-                  <a:srgbClr val="FFC000"/>
-                </a:solidFill>
-              </a:rPr>
-              <a:t>equals()</a:t>
-            </a:r>
-            <a:r>
-              <a:rPr lang="pt-BR" sz="2400" dirty="0" smtClean="0"/>
-              <a:t> realizando a comparação pela descrição do produto. Em outras palavras, dois produtos serão iguais quando possuírem a mesma descrição.</a:t>
-            </a:r>
-            <a:endParaRPr lang="pt-BR" sz="2400" dirty="0"/>
-          </a:p>
-        </p:txBody>
-      </p:sp>
-      <p:sp>
-        <p:nvSpPr>
-          <p:cNvPr id="4" name="Espaço Reservado para Número de Slide 3"/>
-          <p:cNvSpPr>
-            <a:spLocks noGrp="1"/>
-          </p:cNvSpPr>
-          <p:nvPr>
-            <p:ph type="sldNum" sz="quarter" idx="12"/>
-          </p:nvPr>
-        </p:nvSpPr>
-        <p:spPr/>
-        <p:txBody>
-          <a:bodyPr/>
-          <a:lstStyle/>
-          <a:p>
-            <a:pPr>
-              <a:defRPr/>
-            </a:pPr>
-            <a:fld id="{6AC7DC48-89D4-446D-B83C-6D0DD696F928}" type="slidenum">
-              <a:rPr lang="pt-BR" smtClean="0"/>
-              <a:pPr>
-                <a:defRPr/>
-              </a:pPr>
-              <a:t>23</a:t>
-            </a:fld>
-            <a:endParaRPr lang="pt-BR"/>
-          </a:p>
-        </p:txBody>
-      </p:sp>
-    </p:spTree>
-  </p:cSld>
-  <p:clrMapOvr>
-    <a:masterClrMapping/>
-  </p:clrMapOvr>
-  <p:timing>
-    <p:tnLst>
-      <p:par>
-        <p:cTn id="1" dur="indefinite" restart="never" nodeType="tmRoot"/>
-      </p:par>
-    </p:tnLst>
-  </p:timing>
-</p:sld>
-</file>
-
-<file path=ppt/slides/slide24.xml><?xml version="1.0" encoding="utf-8"?>
-<p:sld xmlns:a="http://schemas.openxmlformats.org/drawingml/2006/main" xmlns:r="http://schemas.openxmlformats.org/officeDocument/2006/relationships" xmlns:p="http://schemas.openxmlformats.org/presentationml/2006/main">
-  <p:cSld>
-    <p:spTree>
-      <p:nvGrpSpPr>
-        <p:cNvPr id="1" name=""/>
-        <p:cNvGrpSpPr/>
-        <p:nvPr/>
-      </p:nvGrpSpPr>
-      <p:grpSpPr>
-        <a:xfrm>
-          <a:off x="0" y="0"/>
-          <a:ext cx="0" cy="0"/>
-          <a:chOff x="0" y="0"/>
-          <a:chExt cx="0" cy="0"/>
-        </a:xfrm>
-      </p:grpSpPr>
-      <p:sp>
-        <p:nvSpPr>
-          <p:cNvPr id="2" name="Title 1"/>
-          <p:cNvSpPr>
-            <a:spLocks noGrp="1"/>
-          </p:cNvSpPr>
-          <p:nvPr>
-            <p:ph type="title"/>
-          </p:nvPr>
-        </p:nvSpPr>
-        <p:spPr/>
-        <p:txBody>
-          <a:bodyPr/>
-          <a:lstStyle/>
-          <a:p>
-            <a:r>
-              <a:rPr lang="pt-BR" dirty="0" smtClean="0"/>
-              <a:t>Exercício (continuação)</a:t>
-            </a:r>
-            <a:endParaRPr lang="pt-BR" dirty="0"/>
-          </a:p>
-        </p:txBody>
-      </p:sp>
-      <p:sp>
-        <p:nvSpPr>
-          <p:cNvPr id="3" name="Content Placeholder 2"/>
-          <p:cNvSpPr>
-            <a:spLocks noGrp="1"/>
-          </p:cNvSpPr>
-          <p:nvPr>
-            <p:ph idx="1"/>
-          </p:nvPr>
-        </p:nvSpPr>
-        <p:spPr/>
-        <p:txBody>
-          <a:bodyPr/>
-          <a:lstStyle/>
-          <a:p>
-            <a:pPr>
-              <a:spcBef>
-                <a:spcPts val="2400"/>
-              </a:spcBef>
-            </a:pPr>
-            <a:r>
-              <a:rPr lang="pt-BR" sz="2400" dirty="0" smtClean="0"/>
-              <a:t>A classe Produto deverá implementar a interface </a:t>
-            </a:r>
-            <a:r>
-              <a:rPr lang="pt-BR" sz="2400" dirty="0" smtClean="0">
-                <a:solidFill>
-                  <a:srgbClr val="FFC000"/>
-                </a:solidFill>
-              </a:rPr>
-              <a:t>Comparable&lt;Produto&gt;</a:t>
-            </a:r>
-            <a:r>
-              <a:rPr lang="pt-BR" sz="2400" dirty="0" smtClean="0"/>
-              <a:t> bem como seu método </a:t>
-            </a:r>
-            <a:r>
-              <a:rPr lang="pt-BR" sz="2400" dirty="0" smtClean="0">
-                <a:solidFill>
-                  <a:srgbClr val="FFC000"/>
-                </a:solidFill>
-              </a:rPr>
-              <a:t>compareTo()</a:t>
-            </a:r>
-            <a:r>
-              <a:rPr lang="pt-BR" sz="2400" dirty="0" smtClean="0"/>
-              <a:t> realizando a comparação também pela descrição em ordem crescente.</a:t>
-            </a:r>
-            <a:br>
-              <a:rPr lang="pt-BR" sz="2400" dirty="0" smtClean="0"/>
-            </a:br>
-            <a:r>
-              <a:rPr lang="pt-BR" sz="2400" dirty="0" smtClean="0"/>
-              <a:t/>
-            </a:r>
-            <a:br>
-              <a:rPr lang="pt-BR" sz="2400" dirty="0" smtClean="0"/>
-            </a:br>
-            <a:r>
-              <a:rPr lang="pt-BR" sz="2400" dirty="0" smtClean="0"/>
-              <a:t>Em outras palavras, o método compareTo() deverá retornar:</a:t>
-            </a:r>
-          </a:p>
-          <a:p>
-            <a:pPr lvl="1">
-              <a:spcBef>
-                <a:spcPts val="2400"/>
-              </a:spcBef>
-            </a:pPr>
-            <a:r>
-              <a:rPr lang="pt-BR" sz="2000" u="sng" dirty="0" smtClean="0"/>
-              <a:t>Um número positivo</a:t>
-            </a:r>
-            <a:r>
-              <a:rPr lang="pt-BR" sz="2000" dirty="0" smtClean="0"/>
-              <a:t> quando a descrição do item em questão for alfabeticamente maior que a descrição do outro produto</a:t>
-            </a:r>
-          </a:p>
-          <a:p>
-            <a:pPr lvl="1">
-              <a:spcBef>
-                <a:spcPts val="600"/>
-              </a:spcBef>
-            </a:pPr>
-            <a:r>
-              <a:rPr lang="pt-BR" sz="2000" u="sng" dirty="0" smtClean="0"/>
-              <a:t>Um número negativo</a:t>
-            </a:r>
-            <a:r>
-              <a:rPr lang="pt-BR" sz="2000" dirty="0" smtClean="0"/>
-              <a:t> quando contrário</a:t>
-            </a:r>
-          </a:p>
-          <a:p>
-            <a:pPr lvl="1">
-              <a:spcBef>
-                <a:spcPts val="600"/>
-              </a:spcBef>
-            </a:pPr>
-            <a:r>
-              <a:rPr lang="pt-BR" sz="2000" u="sng" dirty="0" smtClean="0"/>
-              <a:t>Zero</a:t>
-            </a:r>
-            <a:r>
-              <a:rPr lang="pt-BR" sz="2000" dirty="0" smtClean="0"/>
-              <a:t> quando tiverem a mesma descrição</a:t>
-            </a:r>
-          </a:p>
-        </p:txBody>
-      </p:sp>
-      <p:sp>
-        <p:nvSpPr>
-          <p:cNvPr id="4" name="Espaço Reservado para Número de Slide 3"/>
-          <p:cNvSpPr>
-            <a:spLocks noGrp="1"/>
-          </p:cNvSpPr>
-          <p:nvPr>
-            <p:ph type="sldNum" sz="quarter" idx="12"/>
-          </p:nvPr>
-        </p:nvSpPr>
-        <p:spPr/>
-        <p:txBody>
-          <a:bodyPr/>
-          <a:lstStyle/>
-          <a:p>
-            <a:pPr>
-              <a:defRPr/>
-            </a:pPr>
-            <a:fld id="{6AC7DC48-89D4-446D-B83C-6D0DD696F928}" type="slidenum">
-              <a:rPr lang="pt-BR" smtClean="0"/>
-              <a:pPr>
-                <a:defRPr/>
-              </a:pPr>
-              <a:t>24</a:t>
-            </a:fld>
-            <a:endParaRPr lang="pt-BR"/>
-          </a:p>
-        </p:txBody>
-      </p:sp>
-    </p:spTree>
-  </p:cSld>
-  <p:clrMapOvr>
-    <a:masterClrMapping/>
-  </p:clrMapOvr>
-  <p:timing>
-    <p:tnLst>
-      <p:par>
-        <p:cTn id="1" dur="indefinite" restart="never" nodeType="tmRoot"/>
-      </p:par>
-    </p:tnLst>
-  </p:timing>
-</p:sld>
-</file>
-
-<file path=ppt/slides/slide25.xml><?xml version="1.0" encoding="utf-8"?>
-<p:sld xmlns:a="http://schemas.openxmlformats.org/drawingml/2006/main" xmlns:r="http://schemas.openxmlformats.org/officeDocument/2006/relationships" xmlns:p="http://schemas.openxmlformats.org/presentationml/2006/main">
-  <p:cSld>
-    <p:spTree>
-      <p:nvGrpSpPr>
-        <p:cNvPr id="1" name=""/>
-        <p:cNvGrpSpPr/>
-        <p:nvPr/>
-      </p:nvGrpSpPr>
-      <p:grpSpPr>
-        <a:xfrm>
-          <a:off x="0" y="0"/>
-          <a:ext cx="0" cy="0"/>
-          <a:chOff x="0" y="0"/>
-          <a:chExt cx="0" cy="0"/>
-        </a:xfrm>
-      </p:grpSpPr>
-      <p:sp>
-        <p:nvSpPr>
-          <p:cNvPr id="9218" name="Título 1"/>
-          <p:cNvSpPr>
-            <a:spLocks noGrp="1"/>
-          </p:cNvSpPr>
-          <p:nvPr>
-            <p:ph type="title"/>
-          </p:nvPr>
-        </p:nvSpPr>
-        <p:spPr/>
-        <p:txBody>
-          <a:bodyPr/>
-          <a:lstStyle/>
-          <a:p>
-            <a:pPr eaLnBrk="1" hangingPunct="1"/>
-            <a:r>
-              <a:rPr lang="pt-BR" dirty="0" smtClean="0"/>
-              <a:t>Exercício (fim)</a:t>
-            </a:r>
-          </a:p>
-        </p:txBody>
-      </p:sp>
-      <p:sp>
-        <p:nvSpPr>
-          <p:cNvPr id="9219" name="Espaço Reservado para Conteúdo 2"/>
-          <p:cNvSpPr>
-            <a:spLocks noGrp="1"/>
-          </p:cNvSpPr>
-          <p:nvPr>
-            <p:ph idx="1"/>
-          </p:nvPr>
-        </p:nvSpPr>
-        <p:spPr/>
-        <p:txBody>
-          <a:bodyPr/>
-          <a:lstStyle/>
-          <a:p>
-            <a:r>
-              <a:rPr lang="pt-BR" sz="2400" dirty="0" smtClean="0"/>
-              <a:t>Crie um classe executável chamada </a:t>
-            </a:r>
-            <a:r>
-              <a:rPr lang="pt-BR" sz="2400" dirty="0" err="1" smtClean="0">
-                <a:solidFill>
-                  <a:srgbClr val="FFC000"/>
-                </a:solidFill>
-              </a:rPr>
-              <a:t>ExercicioComparable</a:t>
-            </a:r>
-            <a:r>
-              <a:rPr lang="pt-BR" sz="2400" dirty="0" smtClean="0"/>
-              <a:t> e no método </a:t>
-            </a:r>
-            <a:r>
-              <a:rPr lang="pt-BR" sz="2400" dirty="0" smtClean="0">
-                <a:solidFill>
-                  <a:srgbClr val="FFC000"/>
-                </a:solidFill>
-              </a:rPr>
-              <a:t>main()</a:t>
-            </a:r>
-            <a:r>
-              <a:rPr lang="pt-BR" sz="2400" dirty="0" smtClean="0"/>
-              <a:t> crie 3 instâncias da classe produto conforme abaixo:</a:t>
-            </a:r>
-            <a:endParaRPr lang="pt-BR" sz="2400" u="sng" dirty="0" smtClean="0"/>
-          </a:p>
-          <a:p>
-            <a:pPr marL="450850" indent="0">
-              <a:buNone/>
-              <a:tabLst>
-                <a:tab pos="890588" algn="l"/>
-              </a:tabLst>
-            </a:pPr>
-            <a:endParaRPr lang="pt-BR" sz="1800" b="1" dirty="0" smtClean="0"/>
-          </a:p>
-          <a:p>
-            <a:pPr marL="450850" lvl="1" indent="0">
-              <a:buNone/>
-              <a:tabLst>
-                <a:tab pos="890588" algn="l"/>
-              </a:tabLst>
-            </a:pPr>
-            <a:r>
-              <a:rPr lang="pt-BR" sz="1800" dirty="0" smtClean="0">
-                <a:solidFill>
-                  <a:srgbClr val="FFC000"/>
-                </a:solidFill>
-              </a:rPr>
-              <a:t>Produto p1</a:t>
-            </a:r>
-            <a:r>
-              <a:rPr lang="pt-BR" sz="1800" dirty="0" smtClean="0"/>
-              <a:t> = new Produto(805, “Leite Integral”, 1.70);</a:t>
-            </a:r>
-          </a:p>
-          <a:p>
-            <a:pPr marL="450850" lvl="1" indent="0">
-              <a:buNone/>
-              <a:tabLst>
-                <a:tab pos="890588" algn="l"/>
-              </a:tabLst>
-            </a:pPr>
-            <a:r>
-              <a:rPr lang="pt-BR" sz="1800" dirty="0" smtClean="0">
-                <a:solidFill>
-                  <a:srgbClr val="FFC000"/>
-                </a:solidFill>
-              </a:rPr>
-              <a:t>Produto p2</a:t>
-            </a:r>
-            <a:r>
-              <a:rPr lang="pt-BR" sz="1800" dirty="0" smtClean="0"/>
-              <a:t> = new Produto(930, “Café em pó”, 4.80);</a:t>
-            </a:r>
-          </a:p>
-          <a:p>
-            <a:pPr marL="450850" lvl="1" indent="0">
-              <a:buNone/>
-              <a:tabLst>
-                <a:tab pos="890588" algn="l"/>
-              </a:tabLst>
-            </a:pPr>
-            <a:r>
-              <a:rPr lang="pt-BR" sz="1800" dirty="0" smtClean="0">
-                <a:solidFill>
-                  <a:srgbClr val="FFC000"/>
-                </a:solidFill>
-              </a:rPr>
-              <a:t>Produto p3</a:t>
-            </a:r>
-            <a:r>
-              <a:rPr lang="pt-BR" sz="1800" dirty="0" smtClean="0"/>
-              <a:t> = new Produto(110, “Manteiga”, 2.80);</a:t>
-            </a:r>
-          </a:p>
-          <a:p>
-            <a:pPr marL="450850" lvl="1" indent="0">
-              <a:buNone/>
-              <a:tabLst>
-                <a:tab pos="890588" algn="l"/>
-              </a:tabLst>
-            </a:pPr>
-            <a:endParaRPr lang="pt-BR" sz="1800" dirty="0" smtClean="0">
-              <a:solidFill>
-                <a:srgbClr val="FFC000"/>
-              </a:solidFill>
-            </a:endParaRPr>
-          </a:p>
-          <a:p>
-            <a:r>
-              <a:rPr lang="pt-BR" sz="2400" dirty="0" smtClean="0"/>
-              <a:t>Em seguida, exiba cada um dos produtos conforme a ordem definida pelo método compareTo() de cada objeto.</a:t>
-            </a:r>
-            <a:endParaRPr lang="pt-BR" sz="2400" u="sng" dirty="0" smtClean="0"/>
-          </a:p>
-        </p:txBody>
-      </p:sp>
-      <p:sp>
-        <p:nvSpPr>
-          <p:cNvPr id="4" name="Espaço Reservado para Número de Slide 3"/>
-          <p:cNvSpPr>
-            <a:spLocks noGrp="1"/>
-          </p:cNvSpPr>
-          <p:nvPr>
-            <p:ph type="sldNum" sz="quarter" idx="12"/>
-          </p:nvPr>
-        </p:nvSpPr>
-        <p:spPr/>
-        <p:txBody>
-          <a:bodyPr/>
-          <a:lstStyle/>
-          <a:p>
-            <a:pPr>
-              <a:defRPr/>
-            </a:pPr>
-            <a:fld id="{6AC7DC48-89D4-446D-B83C-6D0DD696F928}" type="slidenum">
-              <a:rPr lang="pt-BR" smtClean="0"/>
-              <a:pPr>
-                <a:defRPr/>
-              </a:pPr>
-              <a:t>25</a:t>
             </a:fld>
             <a:endParaRPr lang="pt-BR"/>
           </a:p>

</xml_diff>